<commit_message>
fix flow diagram, move code for supplementary material up so all code is in same chuck at start so all objects for in-text r code will exist, small corrections, move deviations from protocol supplementary material, drop supp table 2 & change supp table 1 to figure & update references accordingly, add limitations
</commit_message>
<xml_diff>
--- a/manuscript/manuscript-flow.pptx
+++ b/manuscript/manuscript-flow.pptx
@@ -155,8 +155,8 @@
         </p:nvSpPr>
         <p:spPr>
           <a:xfrm>
-            <a:off x="1524000" y="1122363"/>
-            <a:ext cx="9144000" cy="2387600"/>
+            <a:off x="1524005" y="1122363"/>
+            <a:ext cx="9144001" cy="2387600"/>
           </a:xfrm>
         </p:spPr>
         <p:txBody>
@@ -193,8 +193,8 @@
         </p:nvSpPr>
         <p:spPr>
           <a:xfrm>
-            <a:off x="1524000" y="3602038"/>
-            <a:ext cx="9144000" cy="1655762"/>
+            <a:off x="1524005" y="3602038"/>
+            <a:ext cx="9144001" cy="1655762"/>
           </a:xfrm>
         </p:spPr>
         <p:txBody>
@@ -202,39 +202,39 @@
           <a:lstStyle>
             <a:lvl1pPr marL="0" indent="0" algn="ctr">
               <a:buNone/>
-              <a:defRPr sz="2400"/>
+              <a:defRPr sz="2402"/>
             </a:lvl1pPr>
-            <a:lvl2pPr marL="457200" indent="0" algn="ctr">
+            <a:lvl2pPr marL="457218" indent="0" algn="ctr">
               <a:buNone/>
               <a:defRPr sz="2000"/>
             </a:lvl2pPr>
-            <a:lvl3pPr marL="914400" indent="0" algn="ctr">
-              <a:buNone/>
-              <a:defRPr sz="1800"/>
+            <a:lvl3pPr marL="914431" indent="0" algn="ctr">
+              <a:buNone/>
+              <a:defRPr sz="1801"/>
             </a:lvl3pPr>
-            <a:lvl4pPr marL="1371600" indent="0" algn="ctr">
-              <a:buNone/>
-              <a:defRPr sz="1600"/>
+            <a:lvl4pPr marL="1371652" indent="0" algn="ctr">
+              <a:buNone/>
+              <a:defRPr sz="1598"/>
             </a:lvl4pPr>
-            <a:lvl5pPr marL="1828800" indent="0" algn="ctr">
-              <a:buNone/>
-              <a:defRPr sz="1600"/>
+            <a:lvl5pPr marL="1828867" indent="0" algn="ctr">
+              <a:buNone/>
+              <a:defRPr sz="1598"/>
             </a:lvl5pPr>
-            <a:lvl6pPr marL="2286000" indent="0" algn="ctr">
-              <a:buNone/>
-              <a:defRPr sz="1600"/>
+            <a:lvl6pPr marL="2286086" indent="0" algn="ctr">
+              <a:buNone/>
+              <a:defRPr sz="1598"/>
             </a:lvl6pPr>
-            <a:lvl7pPr marL="2743200" indent="0" algn="ctr">
-              <a:buNone/>
-              <a:defRPr sz="1600"/>
+            <a:lvl7pPr marL="2743301" indent="0" algn="ctr">
+              <a:buNone/>
+              <a:defRPr sz="1598"/>
             </a:lvl7pPr>
-            <a:lvl8pPr marL="3200400" indent="0" algn="ctr">
-              <a:buNone/>
-              <a:defRPr sz="1600"/>
+            <a:lvl8pPr marL="3200518" indent="0" algn="ctr">
+              <a:buNone/>
+              <a:defRPr sz="1598"/>
             </a:lvl8pPr>
-            <a:lvl9pPr marL="3657600" indent="0" algn="ctr">
-              <a:buNone/>
-              <a:defRPr sz="1600"/>
+            <a:lvl9pPr marL="3657736" indent="0" algn="ctr">
+              <a:buNone/>
+              <a:defRPr sz="1598"/>
             </a:lvl9pPr>
           </a:lstStyle>
           <a:p>
@@ -269,7 +269,7 @@
           <a:p>
             <a:fld id="{7342AC4C-EC21-4527-87FB-774E1E0A3BAA}" type="datetimeFigureOut">
               <a:rPr lang="en-GB" smtClean="0"/>
-              <a:t>05/11/2021</a:t>
+              <a:t>29/11/2021</a:t>
             </a:fld>
             <a:endParaRPr lang="en-GB"/>
           </a:p>
@@ -469,7 +469,7 @@
           <a:p>
             <a:fld id="{7342AC4C-EC21-4527-87FB-774E1E0A3BAA}" type="datetimeFigureOut">
               <a:rPr lang="en-GB" smtClean="0"/>
-              <a:t>05/11/2021</a:t>
+              <a:t>29/11/2021</a:t>
             </a:fld>
             <a:endParaRPr lang="en-GB"/>
           </a:p>
@@ -611,7 +611,7 @@
         </p:nvSpPr>
         <p:spPr>
           <a:xfrm>
-            <a:off x="838200" y="365125"/>
+            <a:off x="838203" y="365125"/>
             <a:ext cx="7734300" cy="5811838"/>
           </a:xfrm>
         </p:spPr>
@@ -679,7 +679,7 @@
           <a:p>
             <a:fld id="{7342AC4C-EC21-4527-87FB-774E1E0A3BAA}" type="datetimeFigureOut">
               <a:rPr lang="en-GB" smtClean="0"/>
-              <a:t>05/11/2021</a:t>
+              <a:t>29/11/2021</a:t>
             </a:fld>
             <a:endParaRPr lang="en-GB"/>
           </a:p>
@@ -879,7 +879,7 @@
           <a:p>
             <a:fld id="{7342AC4C-EC21-4527-87FB-774E1E0A3BAA}" type="datetimeFigureOut">
               <a:rPr lang="en-GB" smtClean="0"/>
-              <a:t>05/11/2021</a:t>
+              <a:t>29/11/2021</a:t>
             </a:fld>
             <a:endParaRPr lang="en-GB"/>
           </a:p>
@@ -987,8 +987,8 @@
         </p:nvSpPr>
         <p:spPr>
           <a:xfrm>
-            <a:off x="831850" y="1709738"/>
-            <a:ext cx="10515600" cy="2852737"/>
+            <a:off x="831859" y="1709748"/>
+            <a:ext cx="10515597" cy="2852737"/>
           </a:xfrm>
         </p:spPr>
         <p:txBody>
@@ -1025,8 +1025,8 @@
         </p:nvSpPr>
         <p:spPr>
           <a:xfrm>
-            <a:off x="831850" y="4589463"/>
-            <a:ext cx="10515600" cy="1500187"/>
+            <a:off x="831859" y="4589471"/>
+            <a:ext cx="10515597" cy="1500187"/>
           </a:xfrm>
         </p:spPr>
         <p:txBody>
@@ -1034,7 +1034,7 @@
           <a:lstStyle>
             <a:lvl1pPr marL="0" indent="0">
               <a:buNone/>
-              <a:defRPr sz="2400">
+              <a:defRPr sz="2402">
                 <a:solidFill>
                   <a:schemeClr val="tx1">
                     <a:tint val="75000"/>
@@ -1042,7 +1042,7 @@
                 </a:solidFill>
               </a:defRPr>
             </a:lvl1pPr>
-            <a:lvl2pPr marL="457200" indent="0">
+            <a:lvl2pPr marL="457218" indent="0">
               <a:buNone/>
               <a:defRPr sz="2000">
                 <a:solidFill>
@@ -1052,9 +1052,9 @@
                 </a:solidFill>
               </a:defRPr>
             </a:lvl2pPr>
-            <a:lvl3pPr marL="914400" indent="0">
-              <a:buNone/>
-              <a:defRPr sz="1800">
+            <a:lvl3pPr marL="914431" indent="0">
+              <a:buNone/>
+              <a:defRPr sz="1801">
                 <a:solidFill>
                   <a:schemeClr val="tx1">
                     <a:tint val="75000"/>
@@ -1062,9 +1062,9 @@
                 </a:solidFill>
               </a:defRPr>
             </a:lvl3pPr>
-            <a:lvl4pPr marL="1371600" indent="0">
-              <a:buNone/>
-              <a:defRPr sz="1600">
+            <a:lvl4pPr marL="1371652" indent="0">
+              <a:buNone/>
+              <a:defRPr sz="1598">
                 <a:solidFill>
                   <a:schemeClr val="tx1">
                     <a:tint val="75000"/>
@@ -1072,9 +1072,9 @@
                 </a:solidFill>
               </a:defRPr>
             </a:lvl4pPr>
-            <a:lvl5pPr marL="1828800" indent="0">
-              <a:buNone/>
-              <a:defRPr sz="1600">
+            <a:lvl5pPr marL="1828867" indent="0">
+              <a:buNone/>
+              <a:defRPr sz="1598">
                 <a:solidFill>
                   <a:schemeClr val="tx1">
                     <a:tint val="75000"/>
@@ -1082,9 +1082,9 @@
                 </a:solidFill>
               </a:defRPr>
             </a:lvl5pPr>
-            <a:lvl6pPr marL="2286000" indent="0">
-              <a:buNone/>
-              <a:defRPr sz="1600">
+            <a:lvl6pPr marL="2286086" indent="0">
+              <a:buNone/>
+              <a:defRPr sz="1598">
                 <a:solidFill>
                   <a:schemeClr val="tx1">
                     <a:tint val="75000"/>
@@ -1092,9 +1092,9 @@
                 </a:solidFill>
               </a:defRPr>
             </a:lvl6pPr>
-            <a:lvl7pPr marL="2743200" indent="0">
-              <a:buNone/>
-              <a:defRPr sz="1600">
+            <a:lvl7pPr marL="2743301" indent="0">
+              <a:buNone/>
+              <a:defRPr sz="1598">
                 <a:solidFill>
                   <a:schemeClr val="tx1">
                     <a:tint val="75000"/>
@@ -1102,9 +1102,9 @@
                 </a:solidFill>
               </a:defRPr>
             </a:lvl7pPr>
-            <a:lvl8pPr marL="3200400" indent="0">
-              <a:buNone/>
-              <a:defRPr sz="1600">
+            <a:lvl8pPr marL="3200518" indent="0">
+              <a:buNone/>
+              <a:defRPr sz="1598">
                 <a:solidFill>
                   <a:schemeClr val="tx1">
                     <a:tint val="75000"/>
@@ -1112,9 +1112,9 @@
                 </a:solidFill>
               </a:defRPr>
             </a:lvl8pPr>
-            <a:lvl9pPr marL="3657600" indent="0">
-              <a:buNone/>
-              <a:defRPr sz="1600">
+            <a:lvl9pPr marL="3657736" indent="0">
+              <a:buNone/>
+              <a:defRPr sz="1598">
                 <a:solidFill>
                   <a:schemeClr val="tx1">
                     <a:tint val="75000"/>
@@ -1155,7 +1155,7 @@
           <a:p>
             <a:fld id="{7342AC4C-EC21-4527-87FB-774E1E0A3BAA}" type="datetimeFigureOut">
               <a:rPr lang="en-GB" smtClean="0"/>
-              <a:t>05/11/2021</a:t>
+              <a:t>29/11/2021</a:t>
             </a:fld>
             <a:endParaRPr lang="en-GB"/>
           </a:p>
@@ -1292,8 +1292,8 @@
         </p:nvSpPr>
         <p:spPr>
           <a:xfrm>
-            <a:off x="838200" y="1825625"/>
-            <a:ext cx="5181600" cy="4351338"/>
+            <a:off x="838205" y="1825626"/>
+            <a:ext cx="5181598" cy="4351338"/>
           </a:xfrm>
         </p:spPr>
         <p:txBody>
@@ -1355,8 +1355,8 @@
         </p:nvSpPr>
         <p:spPr>
           <a:xfrm>
-            <a:off x="6172200" y="1825625"/>
-            <a:ext cx="5181600" cy="4351338"/>
+            <a:off x="6172207" y="1825626"/>
+            <a:ext cx="5181598" cy="4351338"/>
           </a:xfrm>
         </p:spPr>
         <p:txBody>
@@ -1423,7 +1423,7 @@
           <a:p>
             <a:fld id="{7342AC4C-EC21-4527-87FB-774E1E0A3BAA}" type="datetimeFigureOut">
               <a:rPr lang="en-GB" smtClean="0"/>
-              <a:t>05/11/2021</a:t>
+              <a:t>29/11/2021</a:t>
             </a:fld>
             <a:endParaRPr lang="en-GB"/>
           </a:p>
@@ -1531,8 +1531,8 @@
         </p:nvSpPr>
         <p:spPr>
           <a:xfrm>
-            <a:off x="839788" y="365125"/>
-            <a:ext cx="10515600" cy="1325563"/>
+            <a:off x="839796" y="365131"/>
+            <a:ext cx="10515597" cy="1325563"/>
           </a:xfrm>
         </p:spPr>
         <p:txBody>
@@ -1565,8 +1565,8 @@
         </p:nvSpPr>
         <p:spPr>
           <a:xfrm>
-            <a:off x="839788" y="1681163"/>
-            <a:ext cx="5157787" cy="823912"/>
+            <a:off x="839792" y="1681164"/>
+            <a:ext cx="5157789" cy="823912"/>
           </a:xfrm>
         </p:spPr>
         <p:txBody>
@@ -1574,39 +1574,39 @@
           <a:lstStyle>
             <a:lvl1pPr marL="0" indent="0">
               <a:buNone/>
-              <a:defRPr sz="2400" b="1"/>
+              <a:defRPr sz="2402" b="1"/>
             </a:lvl1pPr>
-            <a:lvl2pPr marL="457200" indent="0">
+            <a:lvl2pPr marL="457218" indent="0">
               <a:buNone/>
               <a:defRPr sz="2000" b="1"/>
             </a:lvl2pPr>
-            <a:lvl3pPr marL="914400" indent="0">
-              <a:buNone/>
-              <a:defRPr sz="1800" b="1"/>
+            <a:lvl3pPr marL="914431" indent="0">
+              <a:buNone/>
+              <a:defRPr sz="1801" b="1"/>
             </a:lvl3pPr>
-            <a:lvl4pPr marL="1371600" indent="0">
-              <a:buNone/>
-              <a:defRPr sz="1600" b="1"/>
+            <a:lvl4pPr marL="1371652" indent="0">
+              <a:buNone/>
+              <a:defRPr sz="1598" b="1"/>
             </a:lvl4pPr>
-            <a:lvl5pPr marL="1828800" indent="0">
-              <a:buNone/>
-              <a:defRPr sz="1600" b="1"/>
+            <a:lvl5pPr marL="1828867" indent="0">
+              <a:buNone/>
+              <a:defRPr sz="1598" b="1"/>
             </a:lvl5pPr>
-            <a:lvl6pPr marL="2286000" indent="0">
-              <a:buNone/>
-              <a:defRPr sz="1600" b="1"/>
+            <a:lvl6pPr marL="2286086" indent="0">
+              <a:buNone/>
+              <a:defRPr sz="1598" b="1"/>
             </a:lvl6pPr>
-            <a:lvl7pPr marL="2743200" indent="0">
-              <a:buNone/>
-              <a:defRPr sz="1600" b="1"/>
+            <a:lvl7pPr marL="2743301" indent="0">
+              <a:buNone/>
+              <a:defRPr sz="1598" b="1"/>
             </a:lvl7pPr>
-            <a:lvl8pPr marL="3200400" indent="0">
-              <a:buNone/>
-              <a:defRPr sz="1600" b="1"/>
+            <a:lvl8pPr marL="3200518" indent="0">
+              <a:buNone/>
+              <a:defRPr sz="1598" b="1"/>
             </a:lvl8pPr>
-            <a:lvl9pPr marL="3657600" indent="0">
-              <a:buNone/>
-              <a:defRPr sz="1600" b="1"/>
+            <a:lvl9pPr marL="3657736" indent="0">
+              <a:buNone/>
+              <a:defRPr sz="1598" b="1"/>
             </a:lvl9pPr>
           </a:lstStyle>
           <a:p>
@@ -1636,8 +1636,8 @@
         </p:nvSpPr>
         <p:spPr>
           <a:xfrm>
-            <a:off x="839788" y="2505075"/>
-            <a:ext cx="5157787" cy="3684588"/>
+            <a:off x="839792" y="2505076"/>
+            <a:ext cx="5157789" cy="3684588"/>
           </a:xfrm>
         </p:spPr>
         <p:txBody>
@@ -1699,8 +1699,8 @@
         </p:nvSpPr>
         <p:spPr>
           <a:xfrm>
-            <a:off x="6172200" y="1681163"/>
-            <a:ext cx="5183188" cy="823912"/>
+            <a:off x="6172207" y="1681164"/>
+            <a:ext cx="5183185" cy="823912"/>
           </a:xfrm>
         </p:spPr>
         <p:txBody>
@@ -1708,39 +1708,39 @@
           <a:lstStyle>
             <a:lvl1pPr marL="0" indent="0">
               <a:buNone/>
-              <a:defRPr sz="2400" b="1"/>
+              <a:defRPr sz="2402" b="1"/>
             </a:lvl1pPr>
-            <a:lvl2pPr marL="457200" indent="0">
+            <a:lvl2pPr marL="457218" indent="0">
               <a:buNone/>
               <a:defRPr sz="2000" b="1"/>
             </a:lvl2pPr>
-            <a:lvl3pPr marL="914400" indent="0">
-              <a:buNone/>
-              <a:defRPr sz="1800" b="1"/>
+            <a:lvl3pPr marL="914431" indent="0">
+              <a:buNone/>
+              <a:defRPr sz="1801" b="1"/>
             </a:lvl3pPr>
-            <a:lvl4pPr marL="1371600" indent="0">
-              <a:buNone/>
-              <a:defRPr sz="1600" b="1"/>
+            <a:lvl4pPr marL="1371652" indent="0">
+              <a:buNone/>
+              <a:defRPr sz="1598" b="1"/>
             </a:lvl4pPr>
-            <a:lvl5pPr marL="1828800" indent="0">
-              <a:buNone/>
-              <a:defRPr sz="1600" b="1"/>
+            <a:lvl5pPr marL="1828867" indent="0">
+              <a:buNone/>
+              <a:defRPr sz="1598" b="1"/>
             </a:lvl5pPr>
-            <a:lvl6pPr marL="2286000" indent="0">
-              <a:buNone/>
-              <a:defRPr sz="1600" b="1"/>
+            <a:lvl6pPr marL="2286086" indent="0">
+              <a:buNone/>
+              <a:defRPr sz="1598" b="1"/>
             </a:lvl6pPr>
-            <a:lvl7pPr marL="2743200" indent="0">
-              <a:buNone/>
-              <a:defRPr sz="1600" b="1"/>
+            <a:lvl7pPr marL="2743301" indent="0">
+              <a:buNone/>
+              <a:defRPr sz="1598" b="1"/>
             </a:lvl7pPr>
-            <a:lvl8pPr marL="3200400" indent="0">
-              <a:buNone/>
-              <a:defRPr sz="1600" b="1"/>
+            <a:lvl8pPr marL="3200518" indent="0">
+              <a:buNone/>
+              <a:defRPr sz="1598" b="1"/>
             </a:lvl8pPr>
-            <a:lvl9pPr marL="3657600" indent="0">
-              <a:buNone/>
-              <a:defRPr sz="1600" b="1"/>
+            <a:lvl9pPr marL="3657736" indent="0">
+              <a:buNone/>
+              <a:defRPr sz="1598" b="1"/>
             </a:lvl9pPr>
           </a:lstStyle>
           <a:p>
@@ -1770,8 +1770,8 @@
         </p:nvSpPr>
         <p:spPr>
           <a:xfrm>
-            <a:off x="6172200" y="2505075"/>
-            <a:ext cx="5183188" cy="3684588"/>
+            <a:off x="6172207" y="2505076"/>
+            <a:ext cx="5183185" cy="3684588"/>
           </a:xfrm>
         </p:spPr>
         <p:txBody>
@@ -1838,7 +1838,7 @@
           <a:p>
             <a:fld id="{7342AC4C-EC21-4527-87FB-774E1E0A3BAA}" type="datetimeFigureOut">
               <a:rPr lang="en-GB" smtClean="0"/>
-              <a:t>05/11/2021</a:t>
+              <a:t>29/11/2021</a:t>
             </a:fld>
             <a:endParaRPr lang="en-GB"/>
           </a:p>
@@ -1980,7 +1980,7 @@
           <a:p>
             <a:fld id="{7342AC4C-EC21-4527-87FB-774E1E0A3BAA}" type="datetimeFigureOut">
               <a:rPr lang="en-GB" smtClean="0"/>
-              <a:t>05/11/2021</a:t>
+              <a:t>29/11/2021</a:t>
             </a:fld>
             <a:endParaRPr lang="en-GB"/>
           </a:p>
@@ -2093,7 +2093,7 @@
           <a:p>
             <a:fld id="{7342AC4C-EC21-4527-87FB-774E1E0A3BAA}" type="datetimeFigureOut">
               <a:rPr lang="en-GB" smtClean="0"/>
-              <a:t>05/11/2021</a:t>
+              <a:t>29/11/2021</a:t>
             </a:fld>
             <a:endParaRPr lang="en-GB"/>
           </a:p>
@@ -2201,8 +2201,8 @@
         </p:nvSpPr>
         <p:spPr>
           <a:xfrm>
-            <a:off x="839788" y="457200"/>
-            <a:ext cx="3932237" cy="1600200"/>
+            <a:off x="839790" y="457200"/>
+            <a:ext cx="3932238" cy="1600200"/>
           </a:xfrm>
         </p:spPr>
         <p:txBody>
@@ -2239,8 +2239,8 @@
         </p:nvSpPr>
         <p:spPr>
           <a:xfrm>
-            <a:off x="5183188" y="987425"/>
-            <a:ext cx="6172200" cy="4873625"/>
+            <a:off x="5183192" y="987431"/>
+            <a:ext cx="6172201" cy="4873625"/>
           </a:xfrm>
         </p:spPr>
         <p:txBody>
@@ -2253,7 +2253,7 @@
               <a:defRPr sz="2800"/>
             </a:lvl2pPr>
             <a:lvl3pPr>
-              <a:defRPr sz="2400"/>
+              <a:defRPr sz="2402"/>
             </a:lvl3pPr>
             <a:lvl4pPr>
               <a:defRPr sz="2000"/>
@@ -2330,8 +2330,8 @@
         </p:nvSpPr>
         <p:spPr>
           <a:xfrm>
-            <a:off x="839788" y="2057400"/>
-            <a:ext cx="3932237" cy="3811588"/>
+            <a:off x="839790" y="2057400"/>
+            <a:ext cx="3932238" cy="3811588"/>
           </a:xfrm>
         </p:spPr>
         <p:txBody>
@@ -2339,39 +2339,39 @@
           <a:lstStyle>
             <a:lvl1pPr marL="0" indent="0">
               <a:buNone/>
-              <a:defRPr sz="1600"/>
+              <a:defRPr sz="1598"/>
             </a:lvl1pPr>
-            <a:lvl2pPr marL="457200" indent="0">
-              <a:buNone/>
-              <a:defRPr sz="1400"/>
+            <a:lvl2pPr marL="457218" indent="0">
+              <a:buNone/>
+              <a:defRPr sz="1403"/>
             </a:lvl2pPr>
-            <a:lvl3pPr marL="914400" indent="0">
+            <a:lvl3pPr marL="914431" indent="0">
               <a:buNone/>
               <a:defRPr sz="1200"/>
             </a:lvl3pPr>
-            <a:lvl4pPr marL="1371600" indent="0">
-              <a:buNone/>
-              <a:defRPr sz="1000"/>
+            <a:lvl4pPr marL="1371652" indent="0">
+              <a:buNone/>
+              <a:defRPr sz="1001"/>
             </a:lvl4pPr>
-            <a:lvl5pPr marL="1828800" indent="0">
-              <a:buNone/>
-              <a:defRPr sz="1000"/>
+            <a:lvl5pPr marL="1828867" indent="0">
+              <a:buNone/>
+              <a:defRPr sz="1001"/>
             </a:lvl5pPr>
-            <a:lvl6pPr marL="2286000" indent="0">
-              <a:buNone/>
-              <a:defRPr sz="1000"/>
+            <a:lvl6pPr marL="2286086" indent="0">
+              <a:buNone/>
+              <a:defRPr sz="1001"/>
             </a:lvl6pPr>
-            <a:lvl7pPr marL="2743200" indent="0">
-              <a:buNone/>
-              <a:defRPr sz="1000"/>
+            <a:lvl7pPr marL="2743301" indent="0">
+              <a:buNone/>
+              <a:defRPr sz="1001"/>
             </a:lvl7pPr>
-            <a:lvl8pPr marL="3200400" indent="0">
-              <a:buNone/>
-              <a:defRPr sz="1000"/>
+            <a:lvl8pPr marL="3200518" indent="0">
+              <a:buNone/>
+              <a:defRPr sz="1001"/>
             </a:lvl8pPr>
-            <a:lvl9pPr marL="3657600" indent="0">
-              <a:buNone/>
-              <a:defRPr sz="1000"/>
+            <a:lvl9pPr marL="3657736" indent="0">
+              <a:buNone/>
+              <a:defRPr sz="1001"/>
             </a:lvl9pPr>
           </a:lstStyle>
           <a:p>
@@ -2406,7 +2406,7 @@
           <a:p>
             <a:fld id="{7342AC4C-EC21-4527-87FB-774E1E0A3BAA}" type="datetimeFigureOut">
               <a:rPr lang="en-GB" smtClean="0"/>
-              <a:t>05/11/2021</a:t>
+              <a:t>29/11/2021</a:t>
             </a:fld>
             <a:endParaRPr lang="en-GB"/>
           </a:p>
@@ -2514,8 +2514,8 @@
         </p:nvSpPr>
         <p:spPr>
           <a:xfrm>
-            <a:off x="839788" y="457200"/>
-            <a:ext cx="3932237" cy="1600200"/>
+            <a:off x="839790" y="457200"/>
+            <a:ext cx="3932238" cy="1600200"/>
           </a:xfrm>
         </p:spPr>
         <p:txBody>
@@ -2552,8 +2552,8 @@
         </p:nvSpPr>
         <p:spPr>
           <a:xfrm>
-            <a:off x="5183188" y="987425"/>
-            <a:ext cx="6172200" cy="4873625"/>
+            <a:off x="5183192" y="987431"/>
+            <a:ext cx="6172201" cy="4873625"/>
           </a:xfrm>
         </p:spPr>
         <p:txBody>
@@ -2563,35 +2563,35 @@
               <a:buNone/>
               <a:defRPr sz="3200"/>
             </a:lvl1pPr>
-            <a:lvl2pPr marL="457200" indent="0">
+            <a:lvl2pPr marL="457218" indent="0">
               <a:buNone/>
               <a:defRPr sz="2800"/>
             </a:lvl2pPr>
-            <a:lvl3pPr marL="914400" indent="0">
-              <a:buNone/>
-              <a:defRPr sz="2400"/>
+            <a:lvl3pPr marL="914431" indent="0">
+              <a:buNone/>
+              <a:defRPr sz="2402"/>
             </a:lvl3pPr>
-            <a:lvl4pPr marL="1371600" indent="0">
+            <a:lvl4pPr marL="1371652" indent="0">
               <a:buNone/>
               <a:defRPr sz="2000"/>
             </a:lvl4pPr>
-            <a:lvl5pPr marL="1828800" indent="0">
+            <a:lvl5pPr marL="1828867" indent="0">
               <a:buNone/>
               <a:defRPr sz="2000"/>
             </a:lvl5pPr>
-            <a:lvl6pPr marL="2286000" indent="0">
+            <a:lvl6pPr marL="2286086" indent="0">
               <a:buNone/>
               <a:defRPr sz="2000"/>
             </a:lvl6pPr>
-            <a:lvl7pPr marL="2743200" indent="0">
+            <a:lvl7pPr marL="2743301" indent="0">
               <a:buNone/>
               <a:defRPr sz="2000"/>
             </a:lvl7pPr>
-            <a:lvl8pPr marL="3200400" indent="0">
+            <a:lvl8pPr marL="3200518" indent="0">
               <a:buNone/>
               <a:defRPr sz="2000"/>
             </a:lvl8pPr>
-            <a:lvl9pPr marL="3657600" indent="0">
+            <a:lvl9pPr marL="3657736" indent="0">
               <a:buNone/>
               <a:defRPr sz="2000"/>
             </a:lvl9pPr>
@@ -2619,8 +2619,8 @@
         </p:nvSpPr>
         <p:spPr>
           <a:xfrm>
-            <a:off x="839788" y="2057400"/>
-            <a:ext cx="3932237" cy="3811588"/>
+            <a:off x="839790" y="2057400"/>
+            <a:ext cx="3932238" cy="3811588"/>
           </a:xfrm>
         </p:spPr>
         <p:txBody>
@@ -2628,39 +2628,39 @@
           <a:lstStyle>
             <a:lvl1pPr marL="0" indent="0">
               <a:buNone/>
-              <a:defRPr sz="1600"/>
+              <a:defRPr sz="1598"/>
             </a:lvl1pPr>
-            <a:lvl2pPr marL="457200" indent="0">
-              <a:buNone/>
-              <a:defRPr sz="1400"/>
+            <a:lvl2pPr marL="457218" indent="0">
+              <a:buNone/>
+              <a:defRPr sz="1403"/>
             </a:lvl2pPr>
-            <a:lvl3pPr marL="914400" indent="0">
+            <a:lvl3pPr marL="914431" indent="0">
               <a:buNone/>
               <a:defRPr sz="1200"/>
             </a:lvl3pPr>
-            <a:lvl4pPr marL="1371600" indent="0">
-              <a:buNone/>
-              <a:defRPr sz="1000"/>
+            <a:lvl4pPr marL="1371652" indent="0">
+              <a:buNone/>
+              <a:defRPr sz="1001"/>
             </a:lvl4pPr>
-            <a:lvl5pPr marL="1828800" indent="0">
-              <a:buNone/>
-              <a:defRPr sz="1000"/>
+            <a:lvl5pPr marL="1828867" indent="0">
+              <a:buNone/>
+              <a:defRPr sz="1001"/>
             </a:lvl5pPr>
-            <a:lvl6pPr marL="2286000" indent="0">
-              <a:buNone/>
-              <a:defRPr sz="1000"/>
+            <a:lvl6pPr marL="2286086" indent="0">
+              <a:buNone/>
+              <a:defRPr sz="1001"/>
             </a:lvl6pPr>
-            <a:lvl7pPr marL="2743200" indent="0">
-              <a:buNone/>
-              <a:defRPr sz="1000"/>
+            <a:lvl7pPr marL="2743301" indent="0">
+              <a:buNone/>
+              <a:defRPr sz="1001"/>
             </a:lvl7pPr>
-            <a:lvl8pPr marL="3200400" indent="0">
-              <a:buNone/>
-              <a:defRPr sz="1000"/>
+            <a:lvl8pPr marL="3200518" indent="0">
+              <a:buNone/>
+              <a:defRPr sz="1001"/>
             </a:lvl8pPr>
-            <a:lvl9pPr marL="3657600" indent="0">
-              <a:buNone/>
-              <a:defRPr sz="1000"/>
+            <a:lvl9pPr marL="3657736" indent="0">
+              <a:buNone/>
+              <a:defRPr sz="1001"/>
             </a:lvl9pPr>
           </a:lstStyle>
           <a:p>
@@ -2695,7 +2695,7 @@
           <a:p>
             <a:fld id="{7342AC4C-EC21-4527-87FB-774E1E0A3BAA}" type="datetimeFigureOut">
               <a:rPr lang="en-GB" smtClean="0"/>
-              <a:t>05/11/2021</a:t>
+              <a:t>29/11/2021</a:t>
             </a:fld>
             <a:endParaRPr lang="en-GB"/>
           </a:p>
@@ -2808,8 +2808,8 @@
         </p:nvSpPr>
         <p:spPr>
           <a:xfrm>
-            <a:off x="838200" y="365125"/>
-            <a:ext cx="10515600" cy="1325563"/>
+            <a:off x="838209" y="365131"/>
+            <a:ext cx="10515597" cy="1325563"/>
           </a:xfrm>
           <a:prstGeom prst="rect">
             <a:avLst/>
@@ -2847,8 +2847,8 @@
         </p:nvSpPr>
         <p:spPr>
           <a:xfrm>
-            <a:off x="838200" y="1825625"/>
-            <a:ext cx="10515600" cy="4351338"/>
+            <a:off x="838209" y="1825626"/>
+            <a:ext cx="10515597" cy="4351338"/>
           </a:xfrm>
           <a:prstGeom prst="rect">
             <a:avLst/>
@@ -2915,8 +2915,8 @@
         </p:nvSpPr>
         <p:spPr>
           <a:xfrm>
-            <a:off x="838200" y="6356350"/>
-            <a:ext cx="2743200" cy="365125"/>
+            <a:off x="838206" y="6356360"/>
+            <a:ext cx="2743198" cy="365125"/>
           </a:xfrm>
           <a:prstGeom prst="rect">
             <a:avLst/>
@@ -2938,7 +2938,7 @@
           <a:p>
             <a:fld id="{7342AC4C-EC21-4527-87FB-774E1E0A3BAA}" type="datetimeFigureOut">
               <a:rPr lang="en-GB" smtClean="0"/>
-              <a:t>05/11/2021</a:t>
+              <a:t>29/11/2021</a:t>
             </a:fld>
             <a:endParaRPr lang="en-GB"/>
           </a:p>
@@ -2962,7 +2962,7 @@
         </p:nvSpPr>
         <p:spPr>
           <a:xfrm>
-            <a:off x="4038600" y="6356350"/>
+            <a:off x="4038608" y="6356360"/>
             <a:ext cx="4114800" cy="365125"/>
           </a:xfrm>
           <a:prstGeom prst="rect">
@@ -3005,8 +3005,8 @@
         </p:nvSpPr>
         <p:spPr>
           <a:xfrm>
-            <a:off x="8610600" y="6356350"/>
-            <a:ext cx="2743200" cy="365125"/>
+            <a:off x="8610605" y="6356360"/>
+            <a:ext cx="2743198" cy="365125"/>
           </a:xfrm>
           <a:prstGeom prst="rect">
             <a:avLst/>
@@ -3057,7 +3057,7 @@
   </p:sldLayoutIdLst>
   <p:txStyles>
     <p:titleStyle>
-      <a:lvl1pPr algn="l" defTabSz="914400" rtl="0" eaLnBrk="1" latinLnBrk="0" hangingPunct="1">
+      <a:lvl1pPr algn="l" defTabSz="914431" rtl="0" eaLnBrk="1" latinLnBrk="0" hangingPunct="1">
         <a:lnSpc>
           <a:spcPct val="90000"/>
         </a:lnSpc>
@@ -3065,7 +3065,7 @@
           <a:spcPct val="0"/>
         </a:spcBef>
         <a:buNone/>
-        <a:defRPr sz="4400" kern="1200">
+        <a:defRPr sz="4402" kern="1200">
           <a:solidFill>
             <a:schemeClr val="tx1"/>
           </a:solidFill>
@@ -3076,12 +3076,12 @@
       </a:lvl1pPr>
     </p:titleStyle>
     <p:bodyStyle>
-      <a:lvl1pPr marL="228600" indent="-228600" algn="l" defTabSz="914400" rtl="0" eaLnBrk="1" latinLnBrk="0" hangingPunct="1">
+      <a:lvl1pPr marL="228611" indent="-228611" algn="l" defTabSz="914431" rtl="0" eaLnBrk="1" latinLnBrk="0" hangingPunct="1">
         <a:lnSpc>
           <a:spcPct val="90000"/>
         </a:lnSpc>
         <a:spcBef>
-          <a:spcPts val="1000"/>
+          <a:spcPts val="1001"/>
         </a:spcBef>
         <a:buFont typeface="Arial" panose="020B0604020202020204" pitchFamily="34" charset="0"/>
         <a:buChar char="•"/>
@@ -3094,7 +3094,7 @@
           <a:cs typeface="+mn-cs"/>
         </a:defRPr>
       </a:lvl1pPr>
-      <a:lvl2pPr marL="685800" indent="-228600" algn="l" defTabSz="914400" rtl="0" eaLnBrk="1" latinLnBrk="0" hangingPunct="1">
+      <a:lvl2pPr marL="685827" indent="-228611" algn="l" defTabSz="914431" rtl="0" eaLnBrk="1" latinLnBrk="0" hangingPunct="1">
         <a:lnSpc>
           <a:spcPct val="90000"/>
         </a:lnSpc>
@@ -3103,7 +3103,7 @@
         </a:spcBef>
         <a:buFont typeface="Arial" panose="020B0604020202020204" pitchFamily="34" charset="0"/>
         <a:buChar char="•"/>
-        <a:defRPr sz="2400" kern="1200">
+        <a:defRPr sz="2402" kern="1200">
           <a:solidFill>
             <a:schemeClr val="tx1"/>
           </a:solidFill>
@@ -3112,7 +3112,7 @@
           <a:cs typeface="+mn-cs"/>
         </a:defRPr>
       </a:lvl2pPr>
-      <a:lvl3pPr marL="1143000" indent="-228600" algn="l" defTabSz="914400" rtl="0" eaLnBrk="1" latinLnBrk="0" hangingPunct="1">
+      <a:lvl3pPr marL="1143045" indent="-228611" algn="l" defTabSz="914431" rtl="0" eaLnBrk="1" latinLnBrk="0" hangingPunct="1">
         <a:lnSpc>
           <a:spcPct val="90000"/>
         </a:lnSpc>
@@ -3130,7 +3130,7 @@
           <a:cs typeface="+mn-cs"/>
         </a:defRPr>
       </a:lvl3pPr>
-      <a:lvl4pPr marL="1600200" indent="-228600" algn="l" defTabSz="914400" rtl="0" eaLnBrk="1" latinLnBrk="0" hangingPunct="1">
+      <a:lvl4pPr marL="1600259" indent="-228611" algn="l" defTabSz="914431" rtl="0" eaLnBrk="1" latinLnBrk="0" hangingPunct="1">
         <a:lnSpc>
           <a:spcPct val="90000"/>
         </a:lnSpc>
@@ -3139,7 +3139,7 @@
         </a:spcBef>
         <a:buFont typeface="Arial" panose="020B0604020202020204" pitchFamily="34" charset="0"/>
         <a:buChar char="•"/>
-        <a:defRPr sz="1800" kern="1200">
+        <a:defRPr sz="1801" kern="1200">
           <a:solidFill>
             <a:schemeClr val="tx1"/>
           </a:solidFill>
@@ -3148,7 +3148,7 @@
           <a:cs typeface="+mn-cs"/>
         </a:defRPr>
       </a:lvl4pPr>
-      <a:lvl5pPr marL="2057400" indent="-228600" algn="l" defTabSz="914400" rtl="0" eaLnBrk="1" latinLnBrk="0" hangingPunct="1">
+      <a:lvl5pPr marL="2057478" indent="-228611" algn="l" defTabSz="914431" rtl="0" eaLnBrk="1" latinLnBrk="0" hangingPunct="1">
         <a:lnSpc>
           <a:spcPct val="90000"/>
         </a:lnSpc>
@@ -3157,7 +3157,7 @@
         </a:spcBef>
         <a:buFont typeface="Arial" panose="020B0604020202020204" pitchFamily="34" charset="0"/>
         <a:buChar char="•"/>
-        <a:defRPr sz="1800" kern="1200">
+        <a:defRPr sz="1801" kern="1200">
           <a:solidFill>
             <a:schemeClr val="tx1"/>
           </a:solidFill>
@@ -3166,7 +3166,7 @@
           <a:cs typeface="+mn-cs"/>
         </a:defRPr>
       </a:lvl5pPr>
-      <a:lvl6pPr marL="2514600" indent="-228600" algn="l" defTabSz="914400" rtl="0" eaLnBrk="1" latinLnBrk="0" hangingPunct="1">
+      <a:lvl6pPr marL="2514693" indent="-228611" algn="l" defTabSz="914431" rtl="0" eaLnBrk="1" latinLnBrk="0" hangingPunct="1">
         <a:lnSpc>
           <a:spcPct val="90000"/>
         </a:lnSpc>
@@ -3175,7 +3175,7 @@
         </a:spcBef>
         <a:buFont typeface="Arial" panose="020B0604020202020204" pitchFamily="34" charset="0"/>
         <a:buChar char="•"/>
-        <a:defRPr sz="1800" kern="1200">
+        <a:defRPr sz="1801" kern="1200">
           <a:solidFill>
             <a:schemeClr val="tx1"/>
           </a:solidFill>
@@ -3184,7 +3184,7 @@
           <a:cs typeface="+mn-cs"/>
         </a:defRPr>
       </a:lvl6pPr>
-      <a:lvl7pPr marL="2971800" indent="-228600" algn="l" defTabSz="914400" rtl="0" eaLnBrk="1" latinLnBrk="0" hangingPunct="1">
+      <a:lvl7pPr marL="2971911" indent="-228611" algn="l" defTabSz="914431" rtl="0" eaLnBrk="1" latinLnBrk="0" hangingPunct="1">
         <a:lnSpc>
           <a:spcPct val="90000"/>
         </a:lnSpc>
@@ -3193,7 +3193,7 @@
         </a:spcBef>
         <a:buFont typeface="Arial" panose="020B0604020202020204" pitchFamily="34" charset="0"/>
         <a:buChar char="•"/>
-        <a:defRPr sz="1800" kern="1200">
+        <a:defRPr sz="1801" kern="1200">
           <a:solidFill>
             <a:schemeClr val="tx1"/>
           </a:solidFill>
@@ -3202,7 +3202,7 @@
           <a:cs typeface="+mn-cs"/>
         </a:defRPr>
       </a:lvl7pPr>
-      <a:lvl8pPr marL="3429000" indent="-228600" algn="l" defTabSz="914400" rtl="0" eaLnBrk="1" latinLnBrk="0" hangingPunct="1">
+      <a:lvl8pPr marL="3429129" indent="-228611" algn="l" defTabSz="914431" rtl="0" eaLnBrk="1" latinLnBrk="0" hangingPunct="1">
         <a:lnSpc>
           <a:spcPct val="90000"/>
         </a:lnSpc>
@@ -3211,7 +3211,7 @@
         </a:spcBef>
         <a:buFont typeface="Arial" panose="020B0604020202020204" pitchFamily="34" charset="0"/>
         <a:buChar char="•"/>
-        <a:defRPr sz="1800" kern="1200">
+        <a:defRPr sz="1801" kern="1200">
           <a:solidFill>
             <a:schemeClr val="tx1"/>
           </a:solidFill>
@@ -3220,7 +3220,7 @@
           <a:cs typeface="+mn-cs"/>
         </a:defRPr>
       </a:lvl8pPr>
-      <a:lvl9pPr marL="3886200" indent="-228600" algn="l" defTabSz="914400" rtl="0" eaLnBrk="1" latinLnBrk="0" hangingPunct="1">
+      <a:lvl9pPr marL="3886343" indent="-228611" algn="l" defTabSz="914431" rtl="0" eaLnBrk="1" latinLnBrk="0" hangingPunct="1">
         <a:lnSpc>
           <a:spcPct val="90000"/>
         </a:lnSpc>
@@ -3229,7 +3229,7 @@
         </a:spcBef>
         <a:buFont typeface="Arial" panose="020B0604020202020204" pitchFamily="34" charset="0"/>
         <a:buChar char="•"/>
-        <a:defRPr sz="1800" kern="1200">
+        <a:defRPr sz="1801" kern="1200">
           <a:solidFill>
             <a:schemeClr val="tx1"/>
           </a:solidFill>
@@ -3243,8 +3243,8 @@
       <a:defPPr>
         <a:defRPr lang="en-US"/>
       </a:defPPr>
-      <a:lvl1pPr marL="0" algn="l" defTabSz="914400" rtl="0" eaLnBrk="1" latinLnBrk="0" hangingPunct="1">
-        <a:defRPr sz="1800" kern="1200">
+      <a:lvl1pPr marL="0" algn="l" defTabSz="914431" rtl="0" eaLnBrk="1" latinLnBrk="0" hangingPunct="1">
+        <a:defRPr sz="1801" kern="1200">
           <a:solidFill>
             <a:schemeClr val="tx1"/>
           </a:solidFill>
@@ -3253,8 +3253,8 @@
           <a:cs typeface="+mn-cs"/>
         </a:defRPr>
       </a:lvl1pPr>
-      <a:lvl2pPr marL="457200" algn="l" defTabSz="914400" rtl="0" eaLnBrk="1" latinLnBrk="0" hangingPunct="1">
-        <a:defRPr sz="1800" kern="1200">
+      <a:lvl2pPr marL="457218" algn="l" defTabSz="914431" rtl="0" eaLnBrk="1" latinLnBrk="0" hangingPunct="1">
+        <a:defRPr sz="1801" kern="1200">
           <a:solidFill>
             <a:schemeClr val="tx1"/>
           </a:solidFill>
@@ -3263,8 +3263,8 @@
           <a:cs typeface="+mn-cs"/>
         </a:defRPr>
       </a:lvl2pPr>
-      <a:lvl3pPr marL="914400" algn="l" defTabSz="914400" rtl="0" eaLnBrk="1" latinLnBrk="0" hangingPunct="1">
-        <a:defRPr sz="1800" kern="1200">
+      <a:lvl3pPr marL="914431" algn="l" defTabSz="914431" rtl="0" eaLnBrk="1" latinLnBrk="0" hangingPunct="1">
+        <a:defRPr sz="1801" kern="1200">
           <a:solidFill>
             <a:schemeClr val="tx1"/>
           </a:solidFill>
@@ -3273,8 +3273,8 @@
           <a:cs typeface="+mn-cs"/>
         </a:defRPr>
       </a:lvl3pPr>
-      <a:lvl4pPr marL="1371600" algn="l" defTabSz="914400" rtl="0" eaLnBrk="1" latinLnBrk="0" hangingPunct="1">
-        <a:defRPr sz="1800" kern="1200">
+      <a:lvl4pPr marL="1371652" algn="l" defTabSz="914431" rtl="0" eaLnBrk="1" latinLnBrk="0" hangingPunct="1">
+        <a:defRPr sz="1801" kern="1200">
           <a:solidFill>
             <a:schemeClr val="tx1"/>
           </a:solidFill>
@@ -3283,8 +3283,8 @@
           <a:cs typeface="+mn-cs"/>
         </a:defRPr>
       </a:lvl4pPr>
-      <a:lvl5pPr marL="1828800" algn="l" defTabSz="914400" rtl="0" eaLnBrk="1" latinLnBrk="0" hangingPunct="1">
-        <a:defRPr sz="1800" kern="1200">
+      <a:lvl5pPr marL="1828867" algn="l" defTabSz="914431" rtl="0" eaLnBrk="1" latinLnBrk="0" hangingPunct="1">
+        <a:defRPr sz="1801" kern="1200">
           <a:solidFill>
             <a:schemeClr val="tx1"/>
           </a:solidFill>
@@ -3293,8 +3293,8 @@
           <a:cs typeface="+mn-cs"/>
         </a:defRPr>
       </a:lvl5pPr>
-      <a:lvl6pPr marL="2286000" algn="l" defTabSz="914400" rtl="0" eaLnBrk="1" latinLnBrk="0" hangingPunct="1">
-        <a:defRPr sz="1800" kern="1200">
+      <a:lvl6pPr marL="2286086" algn="l" defTabSz="914431" rtl="0" eaLnBrk="1" latinLnBrk="0" hangingPunct="1">
+        <a:defRPr sz="1801" kern="1200">
           <a:solidFill>
             <a:schemeClr val="tx1"/>
           </a:solidFill>
@@ -3303,8 +3303,8 @@
           <a:cs typeface="+mn-cs"/>
         </a:defRPr>
       </a:lvl6pPr>
-      <a:lvl7pPr marL="2743200" algn="l" defTabSz="914400" rtl="0" eaLnBrk="1" latinLnBrk="0" hangingPunct="1">
-        <a:defRPr sz="1800" kern="1200">
+      <a:lvl7pPr marL="2743301" algn="l" defTabSz="914431" rtl="0" eaLnBrk="1" latinLnBrk="0" hangingPunct="1">
+        <a:defRPr sz="1801" kern="1200">
           <a:solidFill>
             <a:schemeClr val="tx1"/>
           </a:solidFill>
@@ -3313,8 +3313,8 @@
           <a:cs typeface="+mn-cs"/>
         </a:defRPr>
       </a:lvl7pPr>
-      <a:lvl8pPr marL="3200400" algn="l" defTabSz="914400" rtl="0" eaLnBrk="1" latinLnBrk="0" hangingPunct="1">
-        <a:defRPr sz="1800" kern="1200">
+      <a:lvl8pPr marL="3200518" algn="l" defTabSz="914431" rtl="0" eaLnBrk="1" latinLnBrk="0" hangingPunct="1">
+        <a:defRPr sz="1801" kern="1200">
           <a:solidFill>
             <a:schemeClr val="tx1"/>
           </a:solidFill>
@@ -3323,8 +3323,8 @@
           <a:cs typeface="+mn-cs"/>
         </a:defRPr>
       </a:lvl8pPr>
-      <a:lvl9pPr marL="3657600" algn="l" defTabSz="914400" rtl="0" eaLnBrk="1" latinLnBrk="0" hangingPunct="1">
-        <a:defRPr sz="1800" kern="1200">
+      <a:lvl9pPr marL="3657736" algn="l" defTabSz="914431" rtl="0" eaLnBrk="1" latinLnBrk="0" hangingPunct="1">
+        <a:defRPr sz="1801" kern="1200">
           <a:solidFill>
             <a:schemeClr val="tx1"/>
           </a:solidFill>
@@ -3371,7 +3371,7 @@
         </p:nvCxnSpPr>
         <p:spPr bwMode="auto">
           <a:xfrm>
-            <a:off x="2274203" y="-383508"/>
+            <a:off x="5134635" y="-383506"/>
             <a:ext cx="4" cy="398814"/>
           </a:xfrm>
           <a:prstGeom prst="straightConnector1">
@@ -3419,8 +3419,8 @@
         </p:nvSpPr>
         <p:spPr>
           <a:xfrm>
-            <a:off x="1057230" y="-1371638"/>
-            <a:ext cx="2478200" cy="923330"/>
+            <a:off x="3917659" y="-1371638"/>
+            <a:ext cx="2478200" cy="923714"/>
           </a:xfrm>
           <a:prstGeom prst="rect">
             <a:avLst/>
@@ -3437,13 +3437,9 @@
           </a:bodyPr>
           <a:lstStyle/>
           <a:p>
-            <a:pPr algn="ctr">
-              <a:spcAft>
-                <a:spcPts val="0"/>
-              </a:spcAft>
-            </a:pPr>
-            <a:r>
-              <a:rPr lang="en-CA" kern="1400" dirty="0">
+            <a:pPr algn="ctr"/>
+            <a:r>
+              <a:rPr lang="en-CA" sz="1801" kern="1400" dirty="0">
                 <a:solidFill>
                   <a:srgbClr val="000000"/>
                 </a:solidFill>
@@ -3454,7 +3450,7 @@
               <a:t>Records identified via databases</a:t>
             </a:r>
             <a:br>
-              <a:rPr lang="en-CA" kern="1400" dirty="0">
+              <a:rPr lang="en-CA" sz="1801" kern="1400" dirty="0">
                 <a:solidFill>
                   <a:srgbClr val="000000"/>
                 </a:solidFill>
@@ -3464,7 +3460,7 @@
               </a:rPr>
             </a:br>
             <a:r>
-              <a:rPr lang="en-CA" kern="1400" dirty="0">
+              <a:rPr lang="en-CA" sz="1801" kern="1400" dirty="0">
                 <a:solidFill>
                   <a:srgbClr val="000000"/>
                 </a:solidFill>
@@ -3474,11 +3470,10 @@
               </a:rPr>
               <a:t>(n =  2480 )</a:t>
             </a:r>
-            <a:endParaRPr lang="en-GB" kern="1400" dirty="0">
+            <a:endParaRPr lang="en-GB" sz="1801" kern="1400" dirty="0">
               <a:solidFill>
                 <a:srgbClr val="000000"/>
               </a:solidFill>
-              <a:effectLst/>
               <a:latin typeface="Arial" panose="020B0604020202020204" pitchFamily="34" charset="0"/>
               <a:ea typeface="Times New Roman" panose="02020603050405020304" pitchFamily="18" charset="0"/>
               <a:cs typeface="Arial" panose="020B0604020202020204" pitchFamily="34" charset="0"/>
@@ -3500,8 +3495,8 @@
         </p:nvSpPr>
         <p:spPr>
           <a:xfrm>
-            <a:off x="1075169" y="48109"/>
-            <a:ext cx="2492736" cy="923330"/>
+            <a:off x="3935600" y="48112"/>
+            <a:ext cx="2492738" cy="923714"/>
           </a:xfrm>
           <a:prstGeom prst="rect">
             <a:avLst/>
@@ -3518,13 +3513,9 @@
           </a:bodyPr>
           <a:lstStyle/>
           <a:p>
-            <a:pPr algn="ctr">
-              <a:spcAft>
-                <a:spcPts val="0"/>
-              </a:spcAft>
-            </a:pPr>
-            <a:r>
-              <a:rPr lang="en-CA" kern="1400" dirty="0">
+            <a:pPr algn="ctr"/>
+            <a:r>
+              <a:rPr lang="en-CA" sz="1801" kern="1400" dirty="0">
                 <a:solidFill>
                   <a:srgbClr val="000000"/>
                 </a:solidFill>
@@ -3536,13 +3527,9 @@
             </a:r>
           </a:p>
           <a:p>
-            <a:pPr algn="ctr">
-              <a:spcAft>
-                <a:spcPts val="0"/>
-              </a:spcAft>
-            </a:pPr>
-            <a:r>
-              <a:rPr lang="en-CA" kern="1400" dirty="0">
+            <a:pPr algn="ctr"/>
+            <a:r>
+              <a:rPr lang="en-CA" sz="1801" kern="1400" dirty="0">
                 <a:solidFill>
                   <a:srgbClr val="000000"/>
                 </a:solidFill>
@@ -3552,11 +3539,10 @@
               </a:rPr>
               <a:t>(n =  1233 )</a:t>
             </a:r>
-            <a:endParaRPr lang="en-GB" kern="1400" dirty="0">
+            <a:endParaRPr lang="en-GB" sz="1801" kern="1400" dirty="0">
               <a:solidFill>
                 <a:srgbClr val="000000"/>
               </a:solidFill>
-              <a:effectLst/>
               <a:latin typeface="Arial" panose="020B0604020202020204" pitchFamily="34" charset="0"/>
               <a:ea typeface="Times New Roman" panose="02020603050405020304" pitchFamily="18" charset="0"/>
               <a:cs typeface="Arial" panose="020B0604020202020204" pitchFamily="34" charset="0"/>
@@ -3578,8 +3564,8 @@
         </p:nvSpPr>
         <p:spPr>
           <a:xfrm>
-            <a:off x="1075170" y="1482797"/>
-            <a:ext cx="2492734" cy="646331"/>
+            <a:off x="3935602" y="1482799"/>
+            <a:ext cx="2492734" cy="646587"/>
           </a:xfrm>
           <a:prstGeom prst="rect">
             <a:avLst/>
@@ -3596,13 +3582,9 @@
           </a:bodyPr>
           <a:lstStyle/>
           <a:p>
-            <a:pPr algn="ctr">
-              <a:spcAft>
-                <a:spcPts val="0"/>
-              </a:spcAft>
-            </a:pPr>
-            <a:r>
-              <a:rPr lang="en-CA" kern="1400" dirty="0">
+            <a:pPr algn="ctr"/>
+            <a:r>
+              <a:rPr lang="en-CA" sz="1801" kern="1400" dirty="0">
                 <a:solidFill>
                   <a:srgbClr val="000000"/>
                 </a:solidFill>
@@ -3613,7 +3595,7 @@
               <a:t>Records screened</a:t>
             </a:r>
             <a:br>
-              <a:rPr lang="en-CA" kern="1400" dirty="0">
+              <a:rPr lang="en-CA" sz="1801" kern="1400" dirty="0">
                 <a:solidFill>
                   <a:srgbClr val="000000"/>
                 </a:solidFill>
@@ -3623,7 +3605,7 @@
               </a:rPr>
             </a:br>
             <a:r>
-              <a:rPr lang="en-CA" kern="1400" dirty="0">
+              <a:rPr lang="en-CA" sz="1801" kern="1400" dirty="0">
                 <a:solidFill>
                   <a:srgbClr val="000000"/>
                 </a:solidFill>
@@ -3633,11 +3615,10 @@
               </a:rPr>
               <a:t>(n =   1233)</a:t>
             </a:r>
-            <a:endParaRPr lang="en-GB" kern="1400" dirty="0">
+            <a:endParaRPr lang="en-GB" sz="1801" kern="1400" dirty="0">
               <a:solidFill>
                 <a:srgbClr val="000000"/>
               </a:solidFill>
-              <a:effectLst/>
               <a:latin typeface="Arial" panose="020B0604020202020204" pitchFamily="34" charset="0"/>
               <a:ea typeface="Times New Roman" panose="02020603050405020304" pitchFamily="18" charset="0"/>
               <a:cs typeface="Arial" panose="020B0604020202020204" pitchFamily="34" charset="0"/>
@@ -3661,8 +3642,8 @@
         </p:nvCxnSpPr>
         <p:spPr bwMode="auto">
           <a:xfrm>
-            <a:off x="2584732" y="2417262"/>
-            <a:ext cx="1120609" cy="0"/>
+            <a:off x="5445163" y="2417263"/>
+            <a:ext cx="1120608" cy="0"/>
           </a:xfrm>
           <a:prstGeom prst="straightConnector1">
             <a:avLst/>
@@ -3701,8 +3682,8 @@
         </p:nvSpPr>
         <p:spPr>
           <a:xfrm>
-            <a:off x="4140992" y="1497247"/>
-            <a:ext cx="3762206" cy="1477328"/>
+            <a:off x="7001425" y="856231"/>
+            <a:ext cx="4710766" cy="1477969"/>
           </a:xfrm>
           <a:prstGeom prst="rect">
             <a:avLst/>
@@ -3719,13 +3700,9 @@
           </a:bodyPr>
           <a:lstStyle/>
           <a:p>
-            <a:pPr algn="ctr">
-              <a:spcAft>
-                <a:spcPts val="0"/>
-              </a:spcAft>
-            </a:pPr>
-            <a:r>
-              <a:rPr lang="en-CA" kern="1400" dirty="0">
+            <a:pPr algn="ctr"/>
+            <a:r>
+              <a:rPr lang="en-CA" sz="1801" kern="1400" dirty="0">
                 <a:solidFill>
                   <a:srgbClr val="000000"/>
                 </a:solidFill>
@@ -3733,30 +3710,9 @@
                 <a:ea typeface="Times New Roman" panose="02020603050405020304" pitchFamily="18" charset="0"/>
                 <a:cs typeface="Arial" panose="020B0604020202020204" pitchFamily="34" charset="0"/>
               </a:rPr>
-              <a:t>Records excluded</a:t>
-            </a:r>
-            <a:br>
-              <a:rPr lang="en-CA" kern="1400" dirty="0">
-                <a:solidFill>
-                  <a:srgbClr val="000000"/>
-                </a:solidFill>
-                <a:latin typeface="Arial" panose="020B0604020202020204" pitchFamily="34" charset="0"/>
-                <a:ea typeface="Times New Roman" panose="02020603050405020304" pitchFamily="18" charset="0"/>
-                <a:cs typeface="Arial" panose="020B0604020202020204" pitchFamily="34" charset="0"/>
-              </a:rPr>
-            </a:br>
-            <a:r>
-              <a:rPr lang="en-CA" kern="1400" dirty="0">
-                <a:solidFill>
-                  <a:srgbClr val="000000"/>
-                </a:solidFill>
-                <a:latin typeface="Arial" panose="020B0604020202020204" pitchFamily="34" charset="0"/>
-                <a:ea typeface="Times New Roman" panose="02020603050405020304" pitchFamily="18" charset="0"/>
-                <a:cs typeface="Arial" panose="020B0604020202020204" pitchFamily="34" charset="0"/>
-              </a:rPr>
-              <a:t>(n = 475)</a:t>
-            </a:r>
-            <a:endParaRPr lang="en-GB" kern="1400" dirty="0">
+              <a:t>Excluded (n = 475)</a:t>
+            </a:r>
+            <a:endParaRPr lang="en-GB" sz="1801" kern="1400" dirty="0">
               <a:solidFill>
                 <a:srgbClr val="000000"/>
               </a:solidFill>
@@ -3766,13 +3722,8 @@
             </a:endParaRPr>
           </a:p>
           <a:p>
-            <a:pPr>
-              <a:spcAft>
-                <a:spcPts val="0"/>
-              </a:spcAft>
-            </a:pPr>
-            <a:r>
-              <a:rPr lang="en-GB" kern="1400" dirty="0">
+            <a:r>
+              <a:rPr lang="en-GB" sz="1801" kern="1400" dirty="0">
                 <a:solidFill>
                   <a:srgbClr val="000000"/>
                 </a:solidFill>
@@ -3780,17 +3731,12 @@
                 <a:ea typeface="Times New Roman" panose="02020603050405020304" pitchFamily="18" charset="0"/>
                 <a:cs typeface="Arial" panose="020B0604020202020204" pitchFamily="34" charset="0"/>
               </a:rPr>
-              <a:t>Abstracts		n = 409</a:t>
-            </a:r>
-          </a:p>
-          <a:p>
-            <a:pPr>
-              <a:spcAft>
-                <a:spcPts val="0"/>
-              </a:spcAft>
-            </a:pPr>
-            <a:r>
-              <a:rPr lang="en-GB" kern="1400" dirty="0">
+              <a:t>Abstracts			n = 414</a:t>
+            </a:r>
+          </a:p>
+          <a:p>
+            <a:r>
+              <a:rPr lang="en-GB" sz="1801" kern="1400" dirty="0">
                 <a:solidFill>
                   <a:srgbClr val="000000"/>
                 </a:solidFill>
@@ -3798,17 +3744,12 @@
                 <a:ea typeface="Times New Roman" panose="02020603050405020304" pitchFamily="18" charset="0"/>
                 <a:cs typeface="Arial" panose="020B0604020202020204" pitchFamily="34" charset="0"/>
               </a:rPr>
-              <a:t>Corrections		n = 19</a:t>
-            </a:r>
-          </a:p>
-          <a:p>
-            <a:pPr>
-              <a:spcAft>
-                <a:spcPts val="0"/>
-              </a:spcAft>
-            </a:pPr>
-            <a:r>
-              <a:rPr lang="en-GB" kern="1400" dirty="0">
+              <a:t>Corrections			n = 19</a:t>
+            </a:r>
+          </a:p>
+          <a:p>
+            <a:r>
+              <a:rPr lang="en-GB" sz="1801" kern="1400" dirty="0">
                 <a:solidFill>
                   <a:srgbClr val="000000"/>
                 </a:solidFill>
@@ -3816,9 +3757,22 @@
                 <a:ea typeface="Times New Roman" panose="02020603050405020304" pitchFamily="18" charset="0"/>
                 <a:cs typeface="Arial" panose="020B0604020202020204" pitchFamily="34" charset="0"/>
               </a:rPr>
-              <a:t>Other			n = 47</a:t>
-            </a:r>
-            <a:endParaRPr lang="en-CA" kern="1400" dirty="0">
+              <a:t>News, editorial, comment, 		</a:t>
+            </a:r>
+          </a:p>
+          <a:p>
+            <a:r>
+              <a:rPr lang="en-GB" sz="1801" kern="1400" dirty="0">
+                <a:solidFill>
+                  <a:srgbClr val="000000"/>
+                </a:solidFill>
+                <a:latin typeface="Arial" panose="020B0604020202020204" pitchFamily="34" charset="0"/>
+                <a:ea typeface="Times New Roman" panose="02020603050405020304" pitchFamily="18" charset="0"/>
+                <a:cs typeface="Arial" panose="020B0604020202020204" pitchFamily="34" charset="0"/>
+              </a:rPr>
+              <a:t>or correspondence articles		 n = 42</a:t>
+            </a:r>
+            <a:endParaRPr lang="en-CA" sz="1801" kern="1400" dirty="0">
               <a:solidFill>
                 <a:srgbClr val="000000"/>
               </a:solidFill>
@@ -3843,8 +3797,8 @@
         </p:nvSpPr>
         <p:spPr>
           <a:xfrm>
-            <a:off x="1057235" y="2695030"/>
-            <a:ext cx="2478200" cy="923330"/>
+            <a:off x="3917668" y="2695033"/>
+            <a:ext cx="2478201" cy="923714"/>
           </a:xfrm>
           <a:prstGeom prst="rect">
             <a:avLst/>
@@ -3861,13 +3815,9 @@
           </a:bodyPr>
           <a:lstStyle/>
           <a:p>
-            <a:pPr algn="ctr">
-              <a:spcAft>
-                <a:spcPts val="0"/>
-              </a:spcAft>
-            </a:pPr>
-            <a:r>
-              <a:rPr lang="en-CA" kern="1400" dirty="0">
+            <a:pPr algn="ctr"/>
+            <a:r>
+              <a:rPr lang="en-CA" sz="1801" kern="1400" dirty="0">
                 <a:solidFill>
                   <a:srgbClr val="000000"/>
                 </a:solidFill>
@@ -3878,7 +3828,7 @@
               <a:t>Full-text articles assessed for eligibility</a:t>
             </a:r>
             <a:br>
-              <a:rPr lang="en-CA" kern="1400" dirty="0">
+              <a:rPr lang="en-CA" sz="1801" kern="1400" dirty="0">
                 <a:solidFill>
                   <a:srgbClr val="000000"/>
                 </a:solidFill>
@@ -3888,7 +3838,7 @@
               </a:rPr>
             </a:br>
             <a:r>
-              <a:rPr lang="en-CA" kern="1400" dirty="0">
+              <a:rPr lang="en-CA" sz="1801" kern="1400" dirty="0">
                 <a:solidFill>
                   <a:srgbClr val="000000"/>
                 </a:solidFill>
@@ -3898,11 +3848,10 @@
               </a:rPr>
               <a:t>(n =  758)</a:t>
             </a:r>
-            <a:endParaRPr lang="en-GB" kern="1400" dirty="0">
+            <a:endParaRPr lang="en-GB" sz="1801" kern="1400" dirty="0">
               <a:solidFill>
                 <a:srgbClr val="000000"/>
               </a:solidFill>
-              <a:effectLst/>
               <a:latin typeface="Arial" panose="020B0604020202020204" pitchFamily="34" charset="0"/>
               <a:ea typeface="Times New Roman" panose="02020603050405020304" pitchFamily="18" charset="0"/>
               <a:cs typeface="Arial" panose="020B0604020202020204" pitchFamily="34" charset="0"/>
@@ -3924,8 +3873,8 @@
         </p:nvSpPr>
         <p:spPr>
           <a:xfrm>
-            <a:off x="1057236" y="4164959"/>
-            <a:ext cx="2478200" cy="646331"/>
+            <a:off x="3917668" y="4164959"/>
+            <a:ext cx="2478201" cy="646587"/>
           </a:xfrm>
           <a:prstGeom prst="rect">
             <a:avLst/>
@@ -3942,13 +3891,9 @@
           </a:bodyPr>
           <a:lstStyle/>
           <a:p>
-            <a:pPr algn="ctr">
-              <a:spcAft>
-                <a:spcPts val="0"/>
-              </a:spcAft>
-            </a:pPr>
-            <a:r>
-              <a:rPr lang="en-CA" kern="1400" dirty="0">
+            <a:pPr algn="ctr"/>
+            <a:r>
+              <a:rPr lang="en-CA" sz="1801" kern="1400" dirty="0">
                 <a:solidFill>
                   <a:srgbClr val="000000"/>
                 </a:solidFill>
@@ -3959,7 +3904,7 @@
               <a:t>Studies classified</a:t>
             </a:r>
             <a:br>
-              <a:rPr lang="en-CA" kern="1400" dirty="0">
+              <a:rPr lang="en-CA" sz="1801" kern="1400" dirty="0">
                 <a:solidFill>
                   <a:srgbClr val="000000"/>
                 </a:solidFill>
@@ -3969,7 +3914,7 @@
               </a:rPr>
             </a:br>
             <a:r>
-              <a:rPr lang="en-CA" kern="1400" dirty="0">
+              <a:rPr lang="en-CA" sz="1801" kern="1400" dirty="0">
                 <a:solidFill>
                   <a:srgbClr val="000000"/>
                 </a:solidFill>
@@ -3979,11 +3924,10 @@
               </a:rPr>
               <a:t>(n = 564)</a:t>
             </a:r>
-            <a:endParaRPr lang="en-GB" kern="1400" dirty="0">
+            <a:endParaRPr lang="en-GB" sz="1801" kern="1400" dirty="0">
               <a:solidFill>
                 <a:srgbClr val="000000"/>
               </a:solidFill>
-              <a:effectLst/>
               <a:latin typeface="Arial" panose="020B0604020202020204" pitchFamily="34" charset="0"/>
               <a:ea typeface="Times New Roman" panose="02020603050405020304" pitchFamily="18" charset="0"/>
               <a:cs typeface="Arial" panose="020B0604020202020204" pitchFamily="34" charset="0"/>
@@ -4005,8 +3949,8 @@
         </p:nvSpPr>
         <p:spPr>
           <a:xfrm>
-            <a:off x="4140990" y="3257411"/>
-            <a:ext cx="3762187" cy="2031325"/>
+            <a:off x="7001427" y="2831163"/>
+            <a:ext cx="4710775" cy="3140732"/>
           </a:xfrm>
           <a:prstGeom prst="rect">
             <a:avLst/>
@@ -4023,13 +3967,9 @@
           </a:bodyPr>
           <a:lstStyle/>
           <a:p>
-            <a:pPr algn="ctr">
-              <a:spcAft>
-                <a:spcPts val="0"/>
-              </a:spcAft>
-            </a:pPr>
-            <a:r>
-              <a:rPr lang="en-CA" kern="1400" dirty="0">
+            <a:pPr algn="ctr"/>
+            <a:r>
+              <a:rPr lang="en-CA" sz="1801" kern="1400" dirty="0">
                 <a:solidFill>
                   <a:srgbClr val="000000"/>
                 </a:solidFill>
@@ -4037,10 +3977,12 @@
                 <a:ea typeface="Times New Roman" panose="02020603050405020304" pitchFamily="18" charset="0"/>
                 <a:cs typeface="Arial" panose="020B0604020202020204" pitchFamily="34" charset="0"/>
               </a:rPr>
-              <a:t>Full-text articles excluded</a:t>
-            </a:r>
-            <a:br>
-              <a:rPr lang="en-CA" kern="1400" dirty="0">
+              <a:t>Excluded (n =  190)</a:t>
+            </a:r>
+          </a:p>
+          <a:p>
+            <a:r>
+              <a:rPr lang="en-CA" sz="1801" kern="1400" dirty="0">
                 <a:solidFill>
                   <a:srgbClr val="000000"/>
                 </a:solidFill>
@@ -4048,9 +3990,12 @@
                 <a:ea typeface="Times New Roman" panose="02020603050405020304" pitchFamily="18" charset="0"/>
                 <a:cs typeface="Arial" panose="020B0604020202020204" pitchFamily="34" charset="0"/>
               </a:rPr>
-            </a:br>
-            <a:r>
-              <a:rPr lang="en-CA" kern="1400" dirty="0">
+              <a:t>Duplicates 			n = 4</a:t>
+            </a:r>
+          </a:p>
+          <a:p>
+            <a:r>
+              <a:rPr lang="en-CA" sz="1801" kern="1400" dirty="0">
                 <a:solidFill>
                   <a:srgbClr val="000000"/>
                 </a:solidFill>
@@ -4058,9 +4003,22 @@
                 <a:ea typeface="Times New Roman" panose="02020603050405020304" pitchFamily="18" charset="0"/>
                 <a:cs typeface="Arial" panose="020B0604020202020204" pitchFamily="34" charset="0"/>
               </a:rPr>
-              <a:t>(n =  190)</a:t>
-            </a:r>
-            <a:endParaRPr lang="en-GB" kern="1400" dirty="0">
+              <a:t>Non-English language		n = 7</a:t>
+            </a:r>
+          </a:p>
+          <a:p>
+            <a:r>
+              <a:rPr lang="en-CA" sz="1801" kern="1400" dirty="0">
+                <a:solidFill>
+                  <a:srgbClr val="000000"/>
+                </a:solidFill>
+                <a:latin typeface="Arial" panose="020B0604020202020204" pitchFamily="34" charset="0"/>
+                <a:ea typeface="Times New Roman" panose="02020603050405020304" pitchFamily="18" charset="0"/>
+                <a:cs typeface="Arial" panose="020B0604020202020204" pitchFamily="34" charset="0"/>
+              </a:rPr>
+              <a:t>Descriptive analysis only		n = 5</a:t>
+            </a:r>
+            <a:endParaRPr lang="en-GB" sz="1801" kern="1400" dirty="0">
               <a:solidFill>
                 <a:srgbClr val="000000"/>
               </a:solidFill>
@@ -4070,13 +4028,8 @@
             </a:endParaRPr>
           </a:p>
           <a:p>
-            <a:pPr>
-              <a:spcAft>
-                <a:spcPts val="0"/>
-              </a:spcAft>
-            </a:pPr>
-            <a:r>
-              <a:rPr lang="en-GB" kern="1400" dirty="0">
+            <a:r>
+              <a:rPr lang="en-GB" sz="1801" kern="1400" dirty="0">
                 <a:solidFill>
                   <a:srgbClr val="000000"/>
                 </a:solidFill>
@@ -4084,17 +4037,12 @@
                 <a:ea typeface="Times New Roman" panose="02020603050405020304" pitchFamily="18" charset="0"/>
                 <a:cs typeface="Arial" panose="020B0604020202020204" pitchFamily="34" charset="0"/>
               </a:rPr>
-              <a:t>Not UK Biobank		n = 66</a:t>
-            </a:r>
-          </a:p>
-          <a:p>
-            <a:pPr>
-              <a:spcAft>
-                <a:spcPts val="0"/>
-              </a:spcAft>
-            </a:pPr>
-            <a:r>
-              <a:rPr lang="en-GB" kern="1400" dirty="0">
+              <a:t>Not UK Biobank			n = 67</a:t>
+            </a:r>
+          </a:p>
+          <a:p>
+            <a:r>
+              <a:rPr lang="en-GB" sz="1801" kern="1400" dirty="0">
                 <a:solidFill>
                   <a:srgbClr val="000000"/>
                 </a:solidFill>
@@ -4102,17 +4050,12 @@
                 <a:ea typeface="Times New Roman" panose="02020603050405020304" pitchFamily="18" charset="0"/>
                 <a:cs typeface="Arial" panose="020B0604020202020204" pitchFamily="34" charset="0"/>
               </a:rPr>
-              <a:t>Review 			n = 48</a:t>
-            </a:r>
-          </a:p>
-          <a:p>
-            <a:pPr>
-              <a:spcAft>
-                <a:spcPts val="0"/>
-              </a:spcAft>
-            </a:pPr>
-            <a:r>
-              <a:rPr lang="en-GB" kern="1400" dirty="0">
+              <a:t>Pooled cohorts			n = 26</a:t>
+            </a:r>
+          </a:p>
+          <a:p>
+            <a:r>
+              <a:rPr lang="en-GB" sz="1801" kern="1400" dirty="0">
                 <a:solidFill>
                   <a:srgbClr val="000000"/>
                 </a:solidFill>
@@ -4120,17 +4063,12 @@
                 <a:ea typeface="Times New Roman" panose="02020603050405020304" pitchFamily="18" charset="0"/>
                 <a:cs typeface="Arial" panose="020B0604020202020204" pitchFamily="34" charset="0"/>
               </a:rPr>
-              <a:t>Summary data		n = 29</a:t>
-            </a:r>
-          </a:p>
-          <a:p>
-            <a:pPr>
-              <a:spcAft>
-                <a:spcPts val="0"/>
-              </a:spcAft>
-            </a:pPr>
-            <a:r>
-              <a:rPr lang="en-GB" kern="1400" dirty="0">
+              <a:t>Qualitative analysis		n = 2</a:t>
+            </a:r>
+          </a:p>
+          <a:p>
+            <a:r>
+              <a:rPr lang="en-GB" sz="1801" kern="1400" dirty="0">
                 <a:solidFill>
                   <a:srgbClr val="000000"/>
                 </a:solidFill>
@@ -4138,17 +4076,12 @@
                 <a:ea typeface="Times New Roman" panose="02020603050405020304" pitchFamily="18" charset="0"/>
                 <a:cs typeface="Arial" panose="020B0604020202020204" pitchFamily="34" charset="0"/>
               </a:rPr>
-              <a:t>Pooled cohorts		n = 24</a:t>
-            </a:r>
-          </a:p>
-          <a:p>
-            <a:pPr>
-              <a:spcAft>
-                <a:spcPts val="0"/>
-              </a:spcAft>
-            </a:pPr>
-            <a:r>
-              <a:rPr lang="en-GB" kern="1400" dirty="0">
+              <a:t>Summary data			n = 30</a:t>
+            </a:r>
+          </a:p>
+          <a:p>
+            <a:r>
+              <a:rPr lang="en-GB" sz="1801" kern="1400" dirty="0">
                 <a:solidFill>
                   <a:srgbClr val="000000"/>
                 </a:solidFill>
@@ -4156,16 +4089,34 @@
                 <a:ea typeface="Times New Roman" panose="02020603050405020304" pitchFamily="18" charset="0"/>
                 <a:cs typeface="Arial" panose="020B0604020202020204" pitchFamily="34" charset="0"/>
               </a:rPr>
-              <a:t>Other 			n = 23</a:t>
-            </a:r>
-            <a:endParaRPr lang="en-CA" kern="1400" dirty="0">
-              <a:solidFill>
-                <a:srgbClr val="000000"/>
-              </a:solidFill>
-              <a:latin typeface="Arial" panose="020B0604020202020204" pitchFamily="34" charset="0"/>
-              <a:ea typeface="Times New Roman" panose="02020603050405020304" pitchFamily="18" charset="0"/>
-              <a:cs typeface="Arial" panose="020B0604020202020204" pitchFamily="34" charset="0"/>
-            </a:endParaRPr>
+              <a:t>Review articles			n = 47 </a:t>
+            </a:r>
+          </a:p>
+          <a:p>
+            <a:r>
+              <a:rPr lang="en-GB" sz="1801" kern="1400" dirty="0">
+                <a:solidFill>
+                  <a:srgbClr val="000000"/>
+                </a:solidFill>
+                <a:latin typeface="Arial" panose="020B0604020202020204" pitchFamily="34" charset="0"/>
+                <a:ea typeface="Times New Roman" panose="02020603050405020304" pitchFamily="18" charset="0"/>
+                <a:cs typeface="Arial" panose="020B0604020202020204" pitchFamily="34" charset="0"/>
+              </a:rPr>
+              <a:t>News, protocol, correspondence</a:t>
+            </a:r>
+          </a:p>
+          <a:p>
+            <a:r>
+              <a:rPr lang="en-GB" sz="1801" kern="1400" dirty="0">
+                <a:solidFill>
+                  <a:srgbClr val="000000"/>
+                </a:solidFill>
+                <a:latin typeface="Arial" panose="020B0604020202020204" pitchFamily="34" charset="0"/>
+                <a:ea typeface="Times New Roman" panose="02020603050405020304" pitchFamily="18" charset="0"/>
+                <a:cs typeface="Arial" panose="020B0604020202020204" pitchFamily="34" charset="0"/>
+              </a:rPr>
+              <a:t>or tool development articles 	n = 6</a:t>
+            </a:r>
           </a:p>
         </p:txBody>
       </p:sp>
@@ -4183,8 +4134,8 @@
         </p:nvSpPr>
         <p:spPr>
           <a:xfrm>
-            <a:off x="1057233" y="5324151"/>
-            <a:ext cx="2478197" cy="923330"/>
+            <a:off x="3917663" y="5324155"/>
+            <a:ext cx="2478196" cy="923714"/>
           </a:xfrm>
           <a:prstGeom prst="rect">
             <a:avLst/>
@@ -4201,13 +4152,9 @@
           </a:bodyPr>
           <a:lstStyle/>
           <a:p>
-            <a:pPr algn="ctr">
-              <a:spcAft>
-                <a:spcPts val="0"/>
-              </a:spcAft>
-            </a:pPr>
-            <a:r>
-              <a:rPr lang="en-CA" kern="1400" dirty="0">
+            <a:pPr algn="ctr"/>
+            <a:r>
+              <a:rPr lang="en-CA" sz="1801" kern="1400" dirty="0">
                 <a:solidFill>
                   <a:srgbClr val="000000"/>
                 </a:solidFill>
@@ -4215,10 +4162,10 @@
                 <a:ea typeface="Times New Roman" panose="02020603050405020304" pitchFamily="18" charset="0"/>
                 <a:cs typeface="Arial" panose="020B0604020202020204" pitchFamily="34" charset="0"/>
               </a:rPr>
-              <a:t>Observational epidemiology studies</a:t>
+              <a:t>Observational epidemiology articles</a:t>
             </a:r>
             <a:br>
-              <a:rPr lang="en-CA" kern="1400" dirty="0">
+              <a:rPr lang="en-CA" sz="1801" kern="1400" dirty="0">
                 <a:solidFill>
                   <a:srgbClr val="000000"/>
                 </a:solidFill>
@@ -4228,7 +4175,7 @@
               </a:rPr>
             </a:br>
             <a:r>
-              <a:rPr lang="en-CA" kern="1400" dirty="0">
+              <a:rPr lang="en-CA" sz="1801" kern="1400" dirty="0">
                 <a:solidFill>
                   <a:srgbClr val="000000"/>
                 </a:solidFill>
@@ -4238,11 +4185,10 @@
               </a:rPr>
               <a:t>(n =  178)</a:t>
             </a:r>
-            <a:endParaRPr lang="en-GB" kern="1400" dirty="0">
+            <a:endParaRPr lang="en-GB" sz="1801" kern="1400" dirty="0">
               <a:solidFill>
                 <a:srgbClr val="000000"/>
               </a:solidFill>
-              <a:effectLst/>
               <a:latin typeface="Arial" panose="020B0604020202020204" pitchFamily="34" charset="0"/>
               <a:ea typeface="Times New Roman" panose="02020603050405020304" pitchFamily="18" charset="0"/>
               <a:cs typeface="Arial" panose="020B0604020202020204" pitchFamily="34" charset="0"/>
@@ -4264,7 +4210,7 @@
         </p:nvSpPr>
         <p:spPr>
           <a:xfrm rot="16200000">
-            <a:off x="-374383" y="-1208440"/>
+            <a:off x="1595090" y="-1208440"/>
             <a:ext cx="1530093" cy="627120"/>
           </a:xfrm>
           <a:prstGeom prst="roundRect">
@@ -4296,7 +4242,7 @@
           <a:p>
             <a:pPr algn="ctr"/>
             <a:r>
-              <a:rPr lang="en-GB" b="1" kern="1400" dirty="0">
+              <a:rPr lang="en-GB" sz="1801" b="1" kern="1400" dirty="0">
                 <a:solidFill>
                   <a:srgbClr val="000000"/>
                 </a:solidFill>
@@ -4305,7 +4251,7 @@
               </a:rPr>
               <a:t>Identification</a:t>
             </a:r>
-            <a:endParaRPr lang="en-GB" b="1" kern="1400" dirty="0">
+            <a:endParaRPr lang="en-GB" sz="1801" b="1" kern="1400" dirty="0">
               <a:solidFill>
                 <a:srgbClr val="000000"/>
               </a:solidFill>
@@ -4328,7 +4274,7 @@
         </p:nvSpPr>
         <p:spPr>
           <a:xfrm rot="16200000">
-            <a:off x="-714952" y="830388"/>
+            <a:off x="1254521" y="830388"/>
             <a:ext cx="2211234" cy="627119"/>
           </a:xfrm>
           <a:prstGeom prst="roundRect">
@@ -4360,7 +4306,7 @@
           <a:p>
             <a:pPr algn="ctr"/>
             <a:r>
-              <a:rPr lang="en-GB" b="1" kern="1400" dirty="0">
+              <a:rPr lang="en-GB" sz="1801" b="1" kern="1400" dirty="0">
                 <a:solidFill>
                   <a:srgbClr val="000000"/>
                 </a:solidFill>
@@ -4369,7 +4315,7 @@
               </a:rPr>
               <a:t>Screening</a:t>
             </a:r>
-            <a:endParaRPr lang="en-GB" b="1" kern="1400" dirty="0">
+            <a:endParaRPr lang="en-GB" sz="1801" b="1" kern="1400" dirty="0">
               <a:solidFill>
                 <a:srgbClr val="000000"/>
               </a:solidFill>
@@ -4392,7 +4338,7 @@
         </p:nvSpPr>
         <p:spPr>
           <a:xfrm rot="16200000">
-            <a:off x="-222128" y="2831456"/>
+            <a:off x="1747345" y="2831456"/>
             <a:ext cx="1225584" cy="627120"/>
           </a:xfrm>
           <a:prstGeom prst="roundRect">
@@ -4424,7 +4370,7 @@
           <a:p>
             <a:pPr algn="ctr"/>
             <a:r>
-              <a:rPr lang="en-GB" b="1" kern="1400" dirty="0">
+              <a:rPr lang="en-GB" sz="1801" b="1" kern="1400" dirty="0">
                 <a:solidFill>
                   <a:srgbClr val="000000"/>
                 </a:solidFill>
@@ -4433,7 +4379,7 @@
               </a:rPr>
               <a:t>Eligibility</a:t>
             </a:r>
-            <a:endParaRPr lang="en-GB" b="1" kern="1400" dirty="0">
+            <a:endParaRPr lang="en-GB" sz="1801" b="1" kern="1400" dirty="0">
               <a:solidFill>
                 <a:srgbClr val="000000"/>
               </a:solidFill>
@@ -4456,8 +4402,8 @@
         </p:nvSpPr>
         <p:spPr>
           <a:xfrm rot="16200000">
-            <a:off x="-1273226" y="5431242"/>
-            <a:ext cx="3327779" cy="627118"/>
+            <a:off x="-687771" y="6815261"/>
+            <a:ext cx="6061990" cy="593289"/>
           </a:xfrm>
           <a:prstGeom prst="roundRect">
             <a:avLst/>
@@ -4488,7 +4434,7 @@
           <a:p>
             <a:pPr algn="ctr"/>
             <a:r>
-              <a:rPr lang="en-GB" b="1" kern="1400" dirty="0">
+              <a:rPr lang="en-GB" sz="1801" b="1" kern="1400" dirty="0">
                 <a:solidFill>
                   <a:srgbClr val="000000"/>
                 </a:solidFill>
@@ -4497,7 +4443,7 @@
               </a:rPr>
               <a:t>Included</a:t>
             </a:r>
-            <a:endParaRPr lang="en-GB" b="1" kern="1400" dirty="0">
+            <a:endParaRPr lang="en-GB" sz="1801" b="1" kern="1400" dirty="0">
               <a:solidFill>
                 <a:srgbClr val="000000"/>
               </a:solidFill>
@@ -4522,8 +4468,8 @@
         </p:nvCxnSpPr>
         <p:spPr bwMode="auto">
           <a:xfrm>
-            <a:off x="2274206" y="1036458"/>
-            <a:ext cx="0" cy="411476"/>
+            <a:off x="5134635" y="1036463"/>
+            <a:ext cx="0" cy="411474"/>
           </a:xfrm>
           <a:prstGeom prst="straightConnector1">
             <a:avLst/>
@@ -4572,7 +4518,7 @@
         </p:nvCxnSpPr>
         <p:spPr bwMode="auto">
           <a:xfrm>
-            <a:off x="2274204" y="2249566"/>
+            <a:off x="5134635" y="2249566"/>
             <a:ext cx="4" cy="398814"/>
           </a:xfrm>
           <a:prstGeom prst="straightConnector1">
@@ -4622,7 +4568,7 @@
         </p:nvCxnSpPr>
         <p:spPr bwMode="auto">
           <a:xfrm>
-            <a:off x="2274199" y="3709068"/>
+            <a:off x="5134630" y="3709069"/>
             <a:ext cx="4" cy="398814"/>
           </a:xfrm>
           <a:prstGeom prst="straightConnector1">
@@ -4672,7 +4618,7 @@
         </p:nvCxnSpPr>
         <p:spPr bwMode="auto">
           <a:xfrm>
-            <a:off x="2274203" y="4855084"/>
+            <a:off x="5134635" y="4855086"/>
             <a:ext cx="4" cy="398814"/>
           </a:xfrm>
           <a:prstGeom prst="straightConnector1">
@@ -4722,8 +4668,8 @@
         </p:nvCxnSpPr>
         <p:spPr bwMode="auto">
           <a:xfrm>
-            <a:off x="2584732" y="3857440"/>
-            <a:ext cx="1120609" cy="0"/>
+            <a:off x="5445163" y="3857441"/>
+            <a:ext cx="1120608" cy="0"/>
           </a:xfrm>
           <a:prstGeom prst="straightConnector1">
             <a:avLst/>
@@ -4748,48 +4694,6 @@
           </a:fontRef>
         </p:style>
       </p:cxnSp>
-      <p:cxnSp>
-        <p:nvCxnSpPr>
-          <p:cNvPr id="83" name="AutoShape 5">
-            <a:extLst>
-              <a:ext uri="{FF2B5EF4-FFF2-40B4-BE49-F238E27FC236}">
-                <a16:creationId xmlns:a16="http://schemas.microsoft.com/office/drawing/2014/main" id="{E7ABCC68-241F-4B74-84B1-C290A82DFC08}"/>
-              </a:ext>
-            </a:extLst>
-          </p:cNvPr>
-          <p:cNvCxnSpPr>
-            <a:cxnSpLocks noChangeShapeType="1"/>
-          </p:cNvCxnSpPr>
-          <p:nvPr/>
-        </p:nvCxnSpPr>
-        <p:spPr bwMode="auto">
-          <a:xfrm>
-            <a:off x="2619441" y="6491542"/>
-            <a:ext cx="1120609" cy="0"/>
-          </a:xfrm>
-          <a:prstGeom prst="straightConnector1">
-            <a:avLst/>
-          </a:prstGeom>
-          <a:ln w="38100">
-            <a:headEnd/>
-            <a:tailEnd type="triangle" w="med" len="med"/>
-          </a:ln>
-        </p:spPr>
-        <p:style>
-          <a:lnRef idx="3">
-            <a:schemeClr val="dk1"/>
-          </a:lnRef>
-          <a:fillRef idx="0">
-            <a:schemeClr val="dk1"/>
-          </a:fillRef>
-          <a:effectRef idx="2">
-            <a:schemeClr val="dk1"/>
-          </a:effectRef>
-          <a:fontRef idx="minor">
-            <a:schemeClr val="tx1"/>
-          </a:fontRef>
-        </p:style>
-      </p:cxnSp>
       <p:sp>
         <p:nvSpPr>
           <p:cNvPr id="84" name="Rectangle 83">
@@ -4804,8 +4708,8 @@
         </p:nvSpPr>
         <p:spPr>
           <a:xfrm>
-            <a:off x="1070058" y="6762360"/>
-            <a:ext cx="2478197" cy="646331"/>
+            <a:off x="3930490" y="6762362"/>
+            <a:ext cx="2478196" cy="646587"/>
           </a:xfrm>
           <a:prstGeom prst="rect">
             <a:avLst/>
@@ -4822,13 +4726,9 @@
           </a:bodyPr>
           <a:lstStyle/>
           <a:p>
-            <a:pPr algn="ctr">
-              <a:spcAft>
-                <a:spcPts val="0"/>
-              </a:spcAft>
-            </a:pPr>
-            <a:r>
-              <a:rPr lang="en-CA" kern="1400" dirty="0">
+            <a:pPr algn="ctr"/>
+            <a:r>
+              <a:rPr lang="en-CA" sz="1801" kern="1400" dirty="0">
                 <a:solidFill>
                   <a:srgbClr val="000000"/>
                 </a:solidFill>
@@ -4839,7 +4739,7 @@
               <a:t>Random sample</a:t>
             </a:r>
             <a:br>
-              <a:rPr lang="en-CA" kern="1400" dirty="0">
+              <a:rPr lang="en-CA" sz="1801" kern="1400" dirty="0">
                 <a:solidFill>
                   <a:srgbClr val="000000"/>
                 </a:solidFill>
@@ -4849,7 +4749,7 @@
               </a:rPr>
             </a:br>
             <a:r>
-              <a:rPr lang="en-CA" kern="1400" dirty="0">
+              <a:rPr lang="en-CA" sz="1801" kern="1400" dirty="0">
                 <a:solidFill>
                   <a:srgbClr val="000000"/>
                 </a:solidFill>
@@ -4857,13 +4757,12 @@
                 <a:ea typeface="Times New Roman" panose="02020603050405020304" pitchFamily="18" charset="0"/>
                 <a:cs typeface="Arial" panose="020B0604020202020204" pitchFamily="34" charset="0"/>
               </a:rPr>
-              <a:t>(n =  90)</a:t>
-            </a:r>
-            <a:endParaRPr lang="en-GB" kern="1400" dirty="0">
+              <a:t>(n =  80)</a:t>
+            </a:r>
+            <a:endParaRPr lang="en-GB" sz="1801" kern="1400" dirty="0">
               <a:solidFill>
                 <a:srgbClr val="000000"/>
               </a:solidFill>
-              <a:effectLst/>
               <a:latin typeface="Arial" panose="020B0604020202020204" pitchFamily="34" charset="0"/>
               <a:ea typeface="Times New Roman" panose="02020603050405020304" pitchFamily="18" charset="0"/>
               <a:cs typeface="Arial" panose="020B0604020202020204" pitchFamily="34" charset="0"/>
@@ -4887,7 +4786,7 @@
         </p:nvCxnSpPr>
         <p:spPr bwMode="auto">
           <a:xfrm>
-            <a:off x="2277968" y="6284041"/>
+            <a:off x="5138397" y="6284043"/>
             <a:ext cx="4" cy="398814"/>
           </a:xfrm>
           <a:prstGeom prst="straightConnector1">
@@ -4935,8 +4834,8 @@
         </p:nvSpPr>
         <p:spPr>
           <a:xfrm>
-            <a:off x="4140991" y="5829785"/>
-            <a:ext cx="3762176" cy="1200329"/>
+            <a:off x="7001420" y="6678072"/>
+            <a:ext cx="4710760" cy="1200842"/>
           </a:xfrm>
           <a:prstGeom prst="rect">
             <a:avLst/>
@@ -4953,13 +4852,9 @@
           </a:bodyPr>
           <a:lstStyle/>
           <a:p>
-            <a:pPr algn="ctr">
-              <a:spcAft>
-                <a:spcPts val="0"/>
-              </a:spcAft>
-            </a:pPr>
-            <a:r>
-              <a:rPr lang="en-CA" kern="1400" dirty="0">
+            <a:pPr algn="ctr"/>
+            <a:r>
+              <a:rPr lang="en-CA" sz="1801" kern="1400" dirty="0">
                 <a:solidFill>
                   <a:srgbClr val="000000"/>
                 </a:solidFill>
@@ -4967,30 +4862,9 @@
                 <a:ea typeface="Times New Roman" panose="02020603050405020304" pitchFamily="18" charset="0"/>
                 <a:cs typeface="Arial" panose="020B0604020202020204" pitchFamily="34" charset="0"/>
               </a:rPr>
-              <a:t>Studies misclassified</a:t>
-            </a:r>
-            <a:br>
-              <a:rPr lang="en-CA" kern="1400" dirty="0">
-                <a:solidFill>
-                  <a:srgbClr val="000000"/>
-                </a:solidFill>
-                <a:latin typeface="Arial" panose="020B0604020202020204" pitchFamily="34" charset="0"/>
-                <a:ea typeface="Times New Roman" panose="02020603050405020304" pitchFamily="18" charset="0"/>
-                <a:cs typeface="Arial" panose="020B0604020202020204" pitchFamily="34" charset="0"/>
-              </a:rPr>
-            </a:br>
-            <a:r>
-              <a:rPr lang="en-CA" kern="1400" dirty="0">
-                <a:solidFill>
-                  <a:srgbClr val="000000"/>
-                </a:solidFill>
-                <a:latin typeface="Arial" panose="020B0604020202020204" pitchFamily="34" charset="0"/>
-                <a:ea typeface="Times New Roman" panose="02020603050405020304" pitchFamily="18" charset="0"/>
-                <a:cs typeface="Arial" panose="020B0604020202020204" pitchFamily="34" charset="0"/>
-              </a:rPr>
-              <a:t>(n = 6)</a:t>
-            </a:r>
-            <a:endParaRPr lang="en-GB" kern="1400" dirty="0">
+              <a:t>Excluded (n = 10)</a:t>
+            </a:r>
+            <a:endParaRPr lang="en-GB" sz="1801" kern="1400" dirty="0">
               <a:solidFill>
                 <a:srgbClr val="000000"/>
               </a:solidFill>
@@ -5000,13 +4874,8 @@
             </a:endParaRPr>
           </a:p>
           <a:p>
-            <a:pPr>
-              <a:spcAft>
-                <a:spcPts val="0"/>
-              </a:spcAft>
-            </a:pPr>
-            <a:r>
-              <a:rPr lang="en-GB" kern="1400" dirty="0">
+            <a:r>
+              <a:rPr lang="en-GB" sz="1801" kern="1400" dirty="0">
                 <a:solidFill>
                   <a:srgbClr val="000000"/>
                 </a:solidFill>
@@ -5014,17 +4883,12 @@
                 <a:ea typeface="Times New Roman" panose="02020603050405020304" pitchFamily="18" charset="0"/>
                 <a:cs typeface="Arial" panose="020B0604020202020204" pitchFamily="34" charset="0"/>
               </a:rPr>
-              <a:t>Prediction models		n = 5</a:t>
-            </a:r>
-          </a:p>
-          <a:p>
-            <a:pPr>
-              <a:spcAft>
-                <a:spcPts val="0"/>
-              </a:spcAft>
-            </a:pPr>
-            <a:r>
-              <a:rPr lang="en-GB" kern="1400" dirty="0">
+              <a:t>Prediction models			n = 7</a:t>
+            </a:r>
+          </a:p>
+          <a:p>
+            <a:r>
+              <a:rPr lang="en-GB" sz="1801" kern="1400" dirty="0">
                 <a:solidFill>
                   <a:srgbClr val="000000"/>
                 </a:solidFill>
@@ -5032,17 +4896,122 @@
                 <a:ea typeface="Times New Roman" panose="02020603050405020304" pitchFamily="18" charset="0"/>
                 <a:cs typeface="Arial" panose="020B0604020202020204" pitchFamily="34" charset="0"/>
               </a:rPr>
-              <a:t>Genetic data		n = 1</a:t>
-            </a:r>
-          </a:p>
-        </p:txBody>
-      </p:sp>
-      <p:sp>
-        <p:nvSpPr>
-          <p:cNvPr id="112" name="Rectangle 111">
-            <a:extLst>
-              <a:ext uri="{FF2B5EF4-FFF2-40B4-BE49-F238E27FC236}">
-                <a16:creationId xmlns:a16="http://schemas.microsoft.com/office/drawing/2014/main" id="{C1A51703-07BA-4FA3-AF8E-282005CCE50C}"/>
+              <a:t>Supplementary material 		n = 3</a:t>
+            </a:r>
+          </a:p>
+          <a:p>
+            <a:r>
+              <a:rPr lang="en-GB" sz="1801" kern="1400" dirty="0">
+                <a:solidFill>
+                  <a:srgbClr val="000000"/>
+                </a:solidFill>
+                <a:latin typeface="Arial" panose="020B0604020202020204" pitchFamily="34" charset="0"/>
+                <a:ea typeface="Times New Roman" panose="02020603050405020304" pitchFamily="18" charset="0"/>
+                <a:cs typeface="Arial" panose="020B0604020202020204" pitchFamily="34" charset="0"/>
+              </a:rPr>
+              <a:t>inaccessible</a:t>
+            </a:r>
+          </a:p>
+        </p:txBody>
+      </p:sp>
+      <p:cxnSp>
+        <p:nvCxnSpPr>
+          <p:cNvPr id="26" name="AutoShape 5">
+            <a:extLst>
+              <a:ext uri="{FF2B5EF4-FFF2-40B4-BE49-F238E27FC236}">
+                <a16:creationId xmlns:a16="http://schemas.microsoft.com/office/drawing/2014/main" id="{53E7F291-F3E1-4FD3-B122-B23A8CDC367F}"/>
+              </a:ext>
+            </a:extLst>
+          </p:cNvPr>
+          <p:cNvCxnSpPr>
+            <a:cxnSpLocks noChangeShapeType="1"/>
+          </p:cNvCxnSpPr>
+          <p:nvPr/>
+        </p:nvCxnSpPr>
+        <p:spPr bwMode="auto">
+          <a:xfrm>
+            <a:off x="5473832" y="7662577"/>
+            <a:ext cx="1120609" cy="0"/>
+          </a:xfrm>
+          <a:prstGeom prst="straightConnector1">
+            <a:avLst/>
+          </a:prstGeom>
+          <a:ln w="38100">
+            <a:headEnd/>
+            <a:tailEnd type="triangle" w="med" len="med"/>
+          </a:ln>
+        </p:spPr>
+        <p:style>
+          <a:lnRef idx="3">
+            <a:schemeClr val="dk1"/>
+          </a:lnRef>
+          <a:fillRef idx="0">
+            <a:schemeClr val="dk1"/>
+          </a:fillRef>
+          <a:effectRef idx="2">
+            <a:schemeClr val="dk1"/>
+          </a:effectRef>
+          <a:fontRef idx="minor">
+            <a:schemeClr val="tx1"/>
+          </a:fontRef>
+        </p:style>
+      </p:cxnSp>
+      <p:cxnSp>
+        <p:nvCxnSpPr>
+          <p:cNvPr id="27" name="AutoShape 2">
+            <a:extLst>
+              <a:ext uri="{FF2B5EF4-FFF2-40B4-BE49-F238E27FC236}">
+                <a16:creationId xmlns:a16="http://schemas.microsoft.com/office/drawing/2014/main" id="{6E03B9B3-BCBB-44BF-B766-5A87635B2D79}"/>
+              </a:ext>
+            </a:extLst>
+          </p:cNvPr>
+          <p:cNvCxnSpPr>
+            <a:cxnSpLocks noChangeShapeType="1"/>
+          </p:cNvCxnSpPr>
+          <p:nvPr/>
+        </p:nvCxnSpPr>
+        <p:spPr bwMode="auto">
+          <a:xfrm>
+            <a:off x="5132359" y="7489801"/>
+            <a:ext cx="4" cy="398814"/>
+          </a:xfrm>
+          <a:prstGeom prst="straightConnector1">
+            <a:avLst/>
+          </a:prstGeom>
+          <a:noFill/>
+          <a:ln w="57150">
+            <a:solidFill>
+              <a:srgbClr val="000000"/>
+            </a:solidFill>
+            <a:round/>
+            <a:headEnd/>
+            <a:tailEnd type="triangle" w="med" len="med"/>
+          </a:ln>
+          <a:effectLst/>
+          <a:extLst>
+            <a:ext uri="{909E8E84-426E-40DD-AFC4-6F175D3DCCD1}">
+              <a14:hiddenFill xmlns:a14="http://schemas.microsoft.com/office/drawing/2010/main">
+                <a:noFill/>
+              </a14:hiddenFill>
+            </a:ext>
+            <a:ext uri="{AF507438-7753-43E0-B8FC-AC1667EBCBE1}">
+              <a14:hiddenEffects xmlns:a14="http://schemas.microsoft.com/office/drawing/2010/main">
+                <a:effectLst>
+                  <a:outerShdw dist="35921" dir="2700000" algn="ctr" rotWithShape="0">
+                    <a:srgbClr val="CCCCCC"/>
+                  </a:outerShdw>
+                </a:effectLst>
+              </a14:hiddenEffects>
+            </a:ext>
+          </a:extLst>
+        </p:spPr>
+      </p:cxnSp>
+      <p:sp>
+        <p:nvSpPr>
+          <p:cNvPr id="30" name="Rectangle 29">
+            <a:extLst>
+              <a:ext uri="{FF2B5EF4-FFF2-40B4-BE49-F238E27FC236}">
+                <a16:creationId xmlns:a16="http://schemas.microsoft.com/office/drawing/2014/main" id="{C5A052FB-D8AD-4D64-A412-9336A54F7290}"/>
               </a:ext>
             </a:extLst>
           </p:cNvPr>
@@ -5051,13 +5020,13 @@
         </p:nvSpPr>
         <p:spPr>
           <a:xfrm>
-            <a:off x="-9438016" y="-2281589"/>
-            <a:ext cx="4957750" cy="5078313"/>
+            <a:off x="5174784" y="9219185"/>
+            <a:ext cx="1961460" cy="923714"/>
           </a:xfrm>
           <a:prstGeom prst="rect">
             <a:avLst/>
           </a:prstGeom>
-          <a:ln w="3175">
+          <a:ln>
             <a:solidFill>
               <a:schemeClr val="tx1"/>
             </a:solidFill>
@@ -5069,13 +5038,9 @@
           </a:bodyPr>
           <a:lstStyle/>
           <a:p>
-            <a:pPr algn="ctr">
-              <a:spcAft>
-                <a:spcPts val="0"/>
-              </a:spcAft>
-            </a:pPr>
-            <a:r>
-              <a:rPr lang="en-CA" sz="3600" kern="1400" dirty="0">
+            <a:pPr algn="ctr"/>
+            <a:r>
+              <a:rPr lang="en-CA" sz="1801" kern="1400" dirty="0">
                 <a:solidFill>
                   <a:srgbClr val="000000"/>
                 </a:solidFill>
@@ -5083,10 +5048,10 @@
                 <a:ea typeface="Times New Roman" panose="02020603050405020304" pitchFamily="18" charset="0"/>
                 <a:cs typeface="Arial" panose="020B0604020202020204" pitchFamily="34" charset="0"/>
               </a:rPr>
-              <a:t>Check the 12 maybes in the endnote file for the screened full texts – they need classifying AND update excluded from observational studies if there are more prediction models </a:t>
-            </a:r>
-            <a:r>
-              <a:rPr lang="en-CA" sz="3600" kern="1400" dirty="0" err="1">
+              <a:t>Case-control designs</a:t>
+            </a:r>
+            <a:br>
+              <a:rPr lang="en-CA" sz="1801" kern="1400" dirty="0">
                 <a:solidFill>
                   <a:srgbClr val="000000"/>
                 </a:solidFill>
@@ -5094,10 +5059,9 @@
                 <a:ea typeface="Times New Roman" panose="02020603050405020304" pitchFamily="18" charset="0"/>
                 <a:cs typeface="Arial" panose="020B0604020202020204" pitchFamily="34" charset="0"/>
               </a:rPr>
-              <a:t>etc</a:t>
-            </a:r>
-            <a:r>
-              <a:rPr lang="en-CA" sz="3600" kern="1400" dirty="0">
+            </a:br>
+            <a:r>
+              <a:rPr lang="en-CA" sz="1801" kern="1400" dirty="0">
                 <a:solidFill>
                   <a:srgbClr val="000000"/>
                 </a:solidFill>
@@ -5105,13 +5069,240 @@
                 <a:ea typeface="Times New Roman" panose="02020603050405020304" pitchFamily="18" charset="0"/>
                 <a:cs typeface="Arial" panose="020B0604020202020204" pitchFamily="34" charset="0"/>
               </a:rPr>
-              <a:t> to be excluded</a:t>
-            </a:r>
-            <a:endParaRPr lang="en-GB" sz="3600" kern="1400" dirty="0">
+              <a:t>(n =  4)</a:t>
+            </a:r>
+            <a:endParaRPr lang="en-GB" sz="1801" kern="1400" dirty="0">
               <a:solidFill>
                 <a:srgbClr val="000000"/>
               </a:solidFill>
-              <a:effectLst/>
+              <a:latin typeface="Arial" panose="020B0604020202020204" pitchFamily="34" charset="0"/>
+              <a:ea typeface="Times New Roman" panose="02020603050405020304" pitchFamily="18" charset="0"/>
+              <a:cs typeface="Arial" panose="020B0604020202020204" pitchFamily="34" charset="0"/>
+            </a:endParaRPr>
+          </a:p>
+        </p:txBody>
+      </p:sp>
+      <p:sp>
+        <p:nvSpPr>
+          <p:cNvPr id="31" name="Rectangle 30">
+            <a:extLst>
+              <a:ext uri="{FF2B5EF4-FFF2-40B4-BE49-F238E27FC236}">
+                <a16:creationId xmlns:a16="http://schemas.microsoft.com/office/drawing/2014/main" id="{C3A90AEB-A3F6-4C7D-AA1F-1FD653C2D748}"/>
+              </a:ext>
+            </a:extLst>
+          </p:cNvPr>
+          <p:cNvSpPr/>
+          <p:nvPr/>
+        </p:nvSpPr>
+        <p:spPr>
+          <a:xfrm>
+            <a:off x="3346725" y="9219185"/>
+            <a:ext cx="1612995" cy="923714"/>
+          </a:xfrm>
+          <a:prstGeom prst="rect">
+            <a:avLst/>
+          </a:prstGeom>
+          <a:ln>
+            <a:solidFill>
+              <a:schemeClr val="tx1"/>
+            </a:solidFill>
+          </a:ln>
+        </p:spPr>
+        <p:txBody>
+          <a:bodyPr wrap="square">
+            <a:spAutoFit/>
+          </a:bodyPr>
+          <a:lstStyle/>
+          <a:p>
+            <a:pPr algn="ctr"/>
+            <a:r>
+              <a:rPr lang="en-CA" sz="1801" kern="1400" dirty="0">
+                <a:solidFill>
+                  <a:srgbClr val="000000"/>
+                </a:solidFill>
+                <a:latin typeface="Arial" panose="020B0604020202020204" pitchFamily="34" charset="0"/>
+                <a:ea typeface="Times New Roman" panose="02020603050405020304" pitchFamily="18" charset="0"/>
+                <a:cs typeface="Arial" panose="020B0604020202020204" pitchFamily="34" charset="0"/>
+              </a:rPr>
+              <a:t>Cohort designs</a:t>
+            </a:r>
+            <a:br>
+              <a:rPr lang="en-CA" sz="1801" kern="1400" dirty="0">
+                <a:solidFill>
+                  <a:srgbClr val="000000"/>
+                </a:solidFill>
+                <a:latin typeface="Arial" panose="020B0604020202020204" pitchFamily="34" charset="0"/>
+                <a:ea typeface="Times New Roman" panose="02020603050405020304" pitchFamily="18" charset="0"/>
+                <a:cs typeface="Arial" panose="020B0604020202020204" pitchFamily="34" charset="0"/>
+              </a:rPr>
+            </a:br>
+            <a:r>
+              <a:rPr lang="en-CA" sz="1801" kern="1400" dirty="0">
+                <a:solidFill>
+                  <a:srgbClr val="000000"/>
+                </a:solidFill>
+                <a:latin typeface="Arial" panose="020B0604020202020204" pitchFamily="34" charset="0"/>
+                <a:ea typeface="Times New Roman" panose="02020603050405020304" pitchFamily="18" charset="0"/>
+                <a:cs typeface="Arial" panose="020B0604020202020204" pitchFamily="34" charset="0"/>
+              </a:rPr>
+              <a:t>(n =  28)</a:t>
+            </a:r>
+            <a:endParaRPr lang="en-GB" sz="1801" kern="1400" dirty="0">
+              <a:solidFill>
+                <a:srgbClr val="000000"/>
+              </a:solidFill>
+              <a:latin typeface="Arial" panose="020B0604020202020204" pitchFamily="34" charset="0"/>
+              <a:ea typeface="Times New Roman" panose="02020603050405020304" pitchFamily="18" charset="0"/>
+              <a:cs typeface="Arial" panose="020B0604020202020204" pitchFamily="34" charset="0"/>
+            </a:endParaRPr>
+          </a:p>
+        </p:txBody>
+      </p:sp>
+      <p:sp>
+        <p:nvSpPr>
+          <p:cNvPr id="32" name="Rectangle 31">
+            <a:extLst>
+              <a:ext uri="{FF2B5EF4-FFF2-40B4-BE49-F238E27FC236}">
+                <a16:creationId xmlns:a16="http://schemas.microsoft.com/office/drawing/2014/main" id="{6A74EC57-1EE9-47D5-8BA0-B00448F1AA5B}"/>
+              </a:ext>
+            </a:extLst>
+          </p:cNvPr>
+          <p:cNvSpPr/>
+          <p:nvPr/>
+        </p:nvSpPr>
+        <p:spPr>
+          <a:xfrm>
+            <a:off x="2992839" y="8051617"/>
+            <a:ext cx="1961460" cy="923714"/>
+          </a:xfrm>
+          <a:prstGeom prst="rect">
+            <a:avLst/>
+          </a:prstGeom>
+          <a:ln>
+            <a:solidFill>
+              <a:schemeClr val="tx1"/>
+            </a:solidFill>
+          </a:ln>
+        </p:spPr>
+        <p:txBody>
+          <a:bodyPr wrap="square">
+            <a:spAutoFit/>
+          </a:bodyPr>
+          <a:lstStyle/>
+          <a:p>
+            <a:pPr algn="ctr"/>
+            <a:r>
+              <a:rPr lang="en-CA" sz="1801" kern="1400" dirty="0">
+                <a:solidFill>
+                  <a:srgbClr val="000000"/>
+                </a:solidFill>
+                <a:latin typeface="Arial" panose="020B0604020202020204" pitchFamily="34" charset="0"/>
+                <a:ea typeface="Times New Roman" panose="02020603050405020304" pitchFamily="18" charset="0"/>
+                <a:cs typeface="Arial" panose="020B0604020202020204" pitchFamily="34" charset="0"/>
+              </a:rPr>
+              <a:t>Cross-sectional designs</a:t>
+            </a:r>
+            <a:br>
+              <a:rPr lang="en-CA" sz="1801" kern="1400" dirty="0">
+                <a:solidFill>
+                  <a:srgbClr val="000000"/>
+                </a:solidFill>
+                <a:latin typeface="Arial" panose="020B0604020202020204" pitchFamily="34" charset="0"/>
+                <a:ea typeface="Times New Roman" panose="02020603050405020304" pitchFamily="18" charset="0"/>
+                <a:cs typeface="Arial" panose="020B0604020202020204" pitchFamily="34" charset="0"/>
+              </a:rPr>
+            </a:br>
+            <a:r>
+              <a:rPr lang="en-CA" sz="1801" kern="1400" dirty="0">
+                <a:solidFill>
+                  <a:srgbClr val="000000"/>
+                </a:solidFill>
+                <a:latin typeface="Arial" panose="020B0604020202020204" pitchFamily="34" charset="0"/>
+                <a:ea typeface="Times New Roman" panose="02020603050405020304" pitchFamily="18" charset="0"/>
+                <a:cs typeface="Arial" panose="020B0604020202020204" pitchFamily="34" charset="0"/>
+              </a:rPr>
+              <a:t>(n =  33)</a:t>
+            </a:r>
+            <a:endParaRPr lang="en-GB" sz="1801" kern="1400" dirty="0">
+              <a:solidFill>
+                <a:srgbClr val="000000"/>
+              </a:solidFill>
+              <a:latin typeface="Arial" panose="020B0604020202020204" pitchFamily="34" charset="0"/>
+              <a:ea typeface="Times New Roman" panose="02020603050405020304" pitchFamily="18" charset="0"/>
+              <a:cs typeface="Arial" panose="020B0604020202020204" pitchFamily="34" charset="0"/>
+            </a:endParaRPr>
+          </a:p>
+        </p:txBody>
+      </p:sp>
+      <p:sp>
+        <p:nvSpPr>
+          <p:cNvPr id="33" name="Rectangle 32">
+            <a:extLst>
+              <a:ext uri="{FF2B5EF4-FFF2-40B4-BE49-F238E27FC236}">
+                <a16:creationId xmlns:a16="http://schemas.microsoft.com/office/drawing/2014/main" id="{0F9AC578-607C-4117-B7A3-4F8E5542B43F}"/>
+              </a:ext>
+            </a:extLst>
+          </p:cNvPr>
+          <p:cNvSpPr/>
+          <p:nvPr/>
+        </p:nvSpPr>
+        <p:spPr>
+          <a:xfrm>
+            <a:off x="5432690" y="8046877"/>
+            <a:ext cx="1961460" cy="923714"/>
+          </a:xfrm>
+          <a:prstGeom prst="rect">
+            <a:avLst/>
+          </a:prstGeom>
+          <a:ln>
+            <a:solidFill>
+              <a:schemeClr val="tx1"/>
+            </a:solidFill>
+          </a:ln>
+        </p:spPr>
+        <p:txBody>
+          <a:bodyPr wrap="square">
+            <a:spAutoFit/>
+          </a:bodyPr>
+          <a:lstStyle/>
+          <a:p>
+            <a:pPr algn="ctr"/>
+            <a:r>
+              <a:rPr lang="en-CA" sz="1801" kern="1400" dirty="0">
+                <a:solidFill>
+                  <a:srgbClr val="000000"/>
+                </a:solidFill>
+                <a:latin typeface="Arial" panose="020B0604020202020204" pitchFamily="34" charset="0"/>
+                <a:ea typeface="Times New Roman" panose="02020603050405020304" pitchFamily="18" charset="0"/>
+                <a:cs typeface="Arial" panose="020B0604020202020204" pitchFamily="34" charset="0"/>
+              </a:rPr>
+              <a:t>Cohort &amp; Cross-sectional designs</a:t>
+            </a:r>
+            <a:br>
+              <a:rPr lang="en-CA" sz="1801" kern="1400" dirty="0">
+                <a:solidFill>
+                  <a:srgbClr val="000000"/>
+                </a:solidFill>
+                <a:latin typeface="Arial" panose="020B0604020202020204" pitchFamily="34" charset="0"/>
+                <a:ea typeface="Times New Roman" panose="02020603050405020304" pitchFamily="18" charset="0"/>
+                <a:cs typeface="Arial" panose="020B0604020202020204" pitchFamily="34" charset="0"/>
+              </a:rPr>
+            </a:br>
+            <a:r>
+              <a:rPr lang="en-CA" sz="1801" kern="1400" dirty="0">
+                <a:solidFill>
+                  <a:srgbClr val="000000"/>
+                </a:solidFill>
+                <a:latin typeface="Arial" panose="020B0604020202020204" pitchFamily="34" charset="0"/>
+                <a:ea typeface="Times New Roman" panose="02020603050405020304" pitchFamily="18" charset="0"/>
+                <a:cs typeface="Arial" panose="020B0604020202020204" pitchFamily="34" charset="0"/>
+              </a:rPr>
+              <a:t>(n =  5)</a:t>
+            </a:r>
+            <a:endParaRPr lang="en-GB" sz="1801" kern="1400" dirty="0">
+              <a:solidFill>
+                <a:srgbClr val="000000"/>
+              </a:solidFill>
               <a:latin typeface="Arial" panose="020B0604020202020204" pitchFamily="34" charset="0"/>
               <a:ea typeface="Times New Roman" panose="02020603050405020304" pitchFamily="18" charset="0"/>
               <a:cs typeface="Arial" panose="020B0604020202020204" pitchFamily="34" charset="0"/>

</xml_diff>